<commit_message>
Commit of PPT Presentation
</commit_message>
<xml_diff>
--- a/Writing/R3M/R3M Update 04-04-2016.pptx
+++ b/Writing/R3M/R3M Update 04-04-2016.pptx
@@ -127,7 +127,7 @@
   </p:defaultTextStyle>
   <p:extLst>
     <p:ext uri="{EFAFB233-063F-42B5-8137-9DF3F51BA10A}">
-      <p15:sldGuideLst xmlns:p15="http://schemas.microsoft.com/office/powerpoint/2012/main" xmlns="">
+      <p15:sldGuideLst xmlns:p15="http://schemas.microsoft.com/office/powerpoint/2012/main">
         <p15:guide id="1" orient="horz" pos="2160">
           <p15:clr>
             <a:srgbClr val="A4A3A4"/>
@@ -145,7 +145,7 @@
 </file>
 
 <file path=ppt/charts/chart1.xml><?xml version="1.0" encoding="utf-8"?>
-<c:chartSpace xmlns:c="http://schemas.openxmlformats.org/drawingml/2006/chart" xmlns:a="http://schemas.openxmlformats.org/drawingml/2006/main" xmlns:r="http://schemas.openxmlformats.org/officeDocument/2006/relationships">
+<c:chartSpace xmlns:c="http://schemas.openxmlformats.org/drawingml/2006/chart" xmlns:a="http://schemas.openxmlformats.org/drawingml/2006/main" xmlns:r="http://schemas.openxmlformats.org/officeDocument/2006/relationships" xmlns:c16r2="http://schemas.microsoft.com/office/drawing/2015/06/chart">
   <c:date1904 val="0"/>
   <c:lang val="en-US"/>
   <c:roundedCorners val="0"/>
@@ -380,6 +380,11 @@
             </c:numRef>
           </c:yVal>
           <c:smooth val="1"/>
+          <c:extLst>
+            <c:ext xmlns:c16="http://schemas.microsoft.com/office/drawing/2014/chart" uri="{C3380CC4-5D6E-409C-BE32-E72D297353CC}">
+              <c16:uniqueId val="{00000000-E7DF-7F4E-94AF-4DDC769A9FC9}"/>
+            </c:ext>
+          </c:extLst>
         </c:ser>
         <c:ser>
           <c:idx val="1"/>
@@ -597,6 +602,11 @@
             </c:numRef>
           </c:yVal>
           <c:smooth val="1"/>
+          <c:extLst>
+            <c:ext xmlns:c16="http://schemas.microsoft.com/office/drawing/2014/chart" uri="{C3380CC4-5D6E-409C-BE32-E72D297353CC}">
+              <c16:uniqueId val="{00000001-E7DF-7F4E-94AF-4DDC769A9FC9}"/>
+            </c:ext>
+          </c:extLst>
         </c:ser>
         <c:dLbls>
           <c:showLegendKey val="0"/>
@@ -641,7 +651,6 @@
               </a:p>
             </c:rich>
           </c:tx>
-          <c:layout/>
           <c:overlay val="0"/>
         </c:title>
         <c:numFmt formatCode="General" sourceLinked="1"/>
@@ -679,7 +688,6 @@
               </a:p>
             </c:rich>
           </c:tx>
-          <c:layout/>
           <c:overlay val="0"/>
         </c:title>
         <c:numFmt formatCode="General" sourceLinked="1"/>
@@ -693,7 +701,6 @@
     </c:plotArea>
     <c:legend>
       <c:legendPos val="r"/>
-      <c:layout/>
       <c:overlay val="0"/>
     </c:legend>
     <c:plotVisOnly val="1"/>
@@ -2215,10 +2222,9 @@
         <a:lstStyle/>
         <a:p>
           <a:r>
-            <a:rPr lang="en-US" dirty="0" smtClean="0"/>
+            <a:rPr lang="en-US" dirty="0"/>
             <a:t>Scoring</a:t>
           </a:r>
-          <a:endParaRPr lang="en-US" dirty="0"/>
         </a:p>
       </dgm:t>
     </dgm:pt>
@@ -2258,10 +2264,9 @@
         <a:lstStyle/>
         <a:p>
           <a:r>
-            <a:rPr lang="en-US" dirty="0" smtClean="0"/>
+            <a:rPr lang="en-US" dirty="0"/>
             <a:t>Testing</a:t>
           </a:r>
-          <a:endParaRPr lang="en-US" dirty="0"/>
         </a:p>
       </dgm:t>
     </dgm:pt>
@@ -2299,10 +2304,9 @@
         <a:lstStyle/>
         <a:p>
           <a:r>
-            <a:rPr lang="en-US" dirty="0" smtClean="0"/>
+            <a:rPr lang="en-US" dirty="0"/>
             <a:t>Training</a:t>
           </a:r>
-          <a:endParaRPr lang="en-US" dirty="0"/>
         </a:p>
       </dgm:t>
     </dgm:pt>
@@ -2346,35 +2350,14 @@
         </dgm:presLayoutVars>
       </dgm:prSet>
       <dgm:spPr/>
-      <dgm:t>
-        <a:bodyPr/>
-        <a:lstStyle/>
-        <a:p>
-          <a:endParaRPr lang="en-US"/>
-        </a:p>
-      </dgm:t>
     </dgm:pt>
     <dgm:pt modelId="{7D979757-5D24-4892-B3FE-1F8C43055959}" type="pres">
       <dgm:prSet presAssocID="{52CF44AB-821C-4C91-A764-9EFA1D060758}" presName="gear1srcNode" presStyleLbl="node1" presStyleIdx="0" presStyleCnt="3"/>
       <dgm:spPr/>
-      <dgm:t>
-        <a:bodyPr/>
-        <a:lstStyle/>
-        <a:p>
-          <a:endParaRPr lang="en-US"/>
-        </a:p>
-      </dgm:t>
     </dgm:pt>
     <dgm:pt modelId="{8F4C9E98-B075-44D2-AEA8-28215C002DAF}" type="pres">
       <dgm:prSet presAssocID="{52CF44AB-821C-4C91-A764-9EFA1D060758}" presName="gear1dstNode" presStyleLbl="node1" presStyleIdx="0" presStyleCnt="3"/>
       <dgm:spPr/>
-      <dgm:t>
-        <a:bodyPr/>
-        <a:lstStyle/>
-        <a:p>
-          <a:endParaRPr lang="en-US"/>
-        </a:p>
-      </dgm:t>
     </dgm:pt>
     <dgm:pt modelId="{965A70C2-C222-402C-9D6B-C45CB15CA58C}" type="pres">
       <dgm:prSet presAssocID="{E6BC5261-6063-42A0-8F4B-20CAFF52B0E9}" presName="gear2" presStyleLbl="node1" presStyleIdx="1" presStyleCnt="3">
@@ -2384,46 +2367,18 @@
         </dgm:presLayoutVars>
       </dgm:prSet>
       <dgm:spPr/>
-      <dgm:t>
-        <a:bodyPr/>
-        <a:lstStyle/>
-        <a:p>
-          <a:endParaRPr lang="en-US"/>
-        </a:p>
-      </dgm:t>
     </dgm:pt>
     <dgm:pt modelId="{7EC10B76-9579-45EB-8E54-18E260B23A7F}" type="pres">
       <dgm:prSet presAssocID="{E6BC5261-6063-42A0-8F4B-20CAFF52B0E9}" presName="gear2srcNode" presStyleLbl="node1" presStyleIdx="1" presStyleCnt="3"/>
       <dgm:spPr/>
-      <dgm:t>
-        <a:bodyPr/>
-        <a:lstStyle/>
-        <a:p>
-          <a:endParaRPr lang="en-US"/>
-        </a:p>
-      </dgm:t>
     </dgm:pt>
     <dgm:pt modelId="{3EC6A3D8-606A-4AB8-98AB-49FE1299D363}" type="pres">
       <dgm:prSet presAssocID="{E6BC5261-6063-42A0-8F4B-20CAFF52B0E9}" presName="gear2dstNode" presStyleLbl="node1" presStyleIdx="1" presStyleCnt="3"/>
       <dgm:spPr/>
-      <dgm:t>
-        <a:bodyPr/>
-        <a:lstStyle/>
-        <a:p>
-          <a:endParaRPr lang="en-US"/>
-        </a:p>
-      </dgm:t>
     </dgm:pt>
     <dgm:pt modelId="{3CB0217A-BF40-4A02-8A5B-3530635C34B8}" type="pres">
       <dgm:prSet presAssocID="{84F88A5E-E955-4FB4-AE6F-649A0961D9B2}" presName="gear3" presStyleLbl="node1" presStyleIdx="2" presStyleCnt="3"/>
       <dgm:spPr/>
-      <dgm:t>
-        <a:bodyPr/>
-        <a:lstStyle/>
-        <a:p>
-          <a:endParaRPr lang="en-US"/>
-        </a:p>
-      </dgm:t>
     </dgm:pt>
     <dgm:pt modelId="{9F616C06-8008-4063-AE59-BE67279ED6FC}" type="pres">
       <dgm:prSet presAssocID="{84F88A5E-E955-4FB4-AE6F-649A0961D9B2}" presName="gear3tx" presStyleLbl="node1" presStyleIdx="2" presStyleCnt="3">
@@ -2433,88 +2388,46 @@
         </dgm:presLayoutVars>
       </dgm:prSet>
       <dgm:spPr/>
-      <dgm:t>
-        <a:bodyPr/>
-        <a:lstStyle/>
-        <a:p>
-          <a:endParaRPr lang="en-US"/>
-        </a:p>
-      </dgm:t>
     </dgm:pt>
     <dgm:pt modelId="{13900D6C-38A3-4016-B9C6-6678E714DDBA}" type="pres">
       <dgm:prSet presAssocID="{84F88A5E-E955-4FB4-AE6F-649A0961D9B2}" presName="gear3srcNode" presStyleLbl="node1" presStyleIdx="2" presStyleCnt="3"/>
       <dgm:spPr/>
-      <dgm:t>
-        <a:bodyPr/>
-        <a:lstStyle/>
-        <a:p>
-          <a:endParaRPr lang="en-US"/>
-        </a:p>
-      </dgm:t>
     </dgm:pt>
     <dgm:pt modelId="{1D2AEE49-4B38-40BD-96AA-0BE4182C81AC}" type="pres">
       <dgm:prSet presAssocID="{84F88A5E-E955-4FB4-AE6F-649A0961D9B2}" presName="gear3dstNode" presStyleLbl="node1" presStyleIdx="2" presStyleCnt="3"/>
       <dgm:spPr/>
-      <dgm:t>
-        <a:bodyPr/>
-        <a:lstStyle/>
-        <a:p>
-          <a:endParaRPr lang="en-US"/>
-        </a:p>
-      </dgm:t>
     </dgm:pt>
     <dgm:pt modelId="{D9DFE31F-2C2B-437C-9251-A48D262DF4C2}" type="pres">
       <dgm:prSet presAssocID="{931FF703-FABD-4332-950B-09219933EE0F}" presName="connector1" presStyleLbl="sibTrans2D1" presStyleIdx="0" presStyleCnt="3"/>
       <dgm:spPr/>
-      <dgm:t>
-        <a:bodyPr/>
-        <a:lstStyle/>
-        <a:p>
-          <a:endParaRPr lang="en-US"/>
-        </a:p>
-      </dgm:t>
     </dgm:pt>
     <dgm:pt modelId="{67E37715-99BE-4F2A-BC8A-96C5E35723ED}" type="pres">
       <dgm:prSet presAssocID="{3EB2DC8B-0052-40E7-98FA-521864FD8544}" presName="connector2" presStyleLbl="sibTrans2D1" presStyleIdx="1" presStyleCnt="3"/>
       <dgm:spPr/>
-      <dgm:t>
-        <a:bodyPr/>
-        <a:lstStyle/>
-        <a:p>
-          <a:endParaRPr lang="en-US"/>
-        </a:p>
-      </dgm:t>
     </dgm:pt>
     <dgm:pt modelId="{F8B7A15D-4F22-431D-9194-00656214C1A2}" type="pres">
       <dgm:prSet presAssocID="{9830636E-9BAC-4317-8DF3-F617BBA2EBD2}" presName="connector3" presStyleLbl="sibTrans2D1" presStyleIdx="2" presStyleCnt="3"/>
       <dgm:spPr/>
-      <dgm:t>
-        <a:bodyPr/>
-        <a:lstStyle/>
-        <a:p>
-          <a:endParaRPr lang="en-US"/>
-        </a:p>
-      </dgm:t>
     </dgm:pt>
   </dgm:ptLst>
   <dgm:cxnLst>
-    <dgm:cxn modelId="{512F5ABF-4B58-467D-A9DB-51889B870164}" type="presOf" srcId="{E6BC5261-6063-42A0-8F4B-20CAFF52B0E9}" destId="{965A70C2-C222-402C-9D6B-C45CB15CA58C}" srcOrd="0" destOrd="0" presId="urn:microsoft.com/office/officeart/2005/8/layout/gear1"/>
+    <dgm:cxn modelId="{D66B4302-1DA7-41A1-9DF0-606DF2606CD0}" type="presOf" srcId="{84F88A5E-E955-4FB4-AE6F-649A0961D9B2}" destId="{3CB0217A-BF40-4A02-8A5B-3530635C34B8}" srcOrd="0" destOrd="0" presId="urn:microsoft.com/office/officeart/2005/8/layout/gear1"/>
     <dgm:cxn modelId="{F5C57916-0D85-411C-ACA5-3F8665CB52EF}" type="presOf" srcId="{E6BC5261-6063-42A0-8F4B-20CAFF52B0E9}" destId="{3EC6A3D8-606A-4AB8-98AB-49FE1299D363}" srcOrd="2" destOrd="0" presId="urn:microsoft.com/office/officeart/2005/8/layout/gear1"/>
-    <dgm:cxn modelId="{10DB16DE-2F11-43CA-8A3E-1B4A16274218}" type="presOf" srcId="{3EB2DC8B-0052-40E7-98FA-521864FD8544}" destId="{67E37715-99BE-4F2A-BC8A-96C5E35723ED}" srcOrd="0" destOrd="0" presId="urn:microsoft.com/office/officeart/2005/8/layout/gear1"/>
-    <dgm:cxn modelId="{26F5B1B4-8F0A-42F4-ABB9-F217D913CC4A}" type="presOf" srcId="{84F88A5E-E955-4FB4-AE6F-649A0961D9B2}" destId="{13900D6C-38A3-4016-B9C6-6678E714DDBA}" srcOrd="2" destOrd="0" presId="urn:microsoft.com/office/officeart/2005/8/layout/gear1"/>
-    <dgm:cxn modelId="{D178DCFE-0474-4F37-823D-8F34F980DA74}" srcId="{99AF8479-7185-4A24-B70E-2A6B4CA94085}" destId="{E6BC5261-6063-42A0-8F4B-20CAFF52B0E9}" srcOrd="1" destOrd="0" parTransId="{9F1B800C-504A-4728-BB6C-F75A93F77488}" sibTransId="{3EB2DC8B-0052-40E7-98FA-521864FD8544}"/>
+    <dgm:cxn modelId="{9FFF4B1F-611B-41C5-BEB4-AC0766867082}" srcId="{99AF8479-7185-4A24-B70E-2A6B4CA94085}" destId="{52CF44AB-821C-4C91-A764-9EFA1D060758}" srcOrd="0" destOrd="0" parTransId="{1A51C856-32B1-4618-8EB8-D20A5C4B36FE}" sibTransId="{931FF703-FABD-4332-950B-09219933EE0F}"/>
     <dgm:cxn modelId="{E517D326-670F-4DE5-86EF-547C3607C5CA}" type="presOf" srcId="{99AF8479-7185-4A24-B70E-2A6B4CA94085}" destId="{B7746EF6-B07A-472A-9662-40C793595B05}" srcOrd="0" destOrd="0" presId="urn:microsoft.com/office/officeart/2005/8/layout/gear1"/>
+    <dgm:cxn modelId="{0542BF6B-22D1-4C80-A4B3-98C68C5227F6}" type="presOf" srcId="{52CF44AB-821C-4C91-A764-9EFA1D060758}" destId="{7D979757-5D24-4892-B3FE-1F8C43055959}" srcOrd="1" destOrd="0" presId="urn:microsoft.com/office/officeart/2005/8/layout/gear1"/>
     <dgm:cxn modelId="{BC4FC66B-E99C-400E-B43E-4F5B3BA54465}" srcId="{99AF8479-7185-4A24-B70E-2A6B4CA94085}" destId="{84F88A5E-E955-4FB4-AE6F-649A0961D9B2}" srcOrd="2" destOrd="0" parTransId="{C075CFF7-2E3A-4CE9-8A1A-1AE46889E3EE}" sibTransId="{9830636E-9BAC-4317-8DF3-F617BBA2EBD2}"/>
     <dgm:cxn modelId="{64B15491-E096-46CC-8CD7-DC92BAB591F5}" type="presOf" srcId="{E6BC5261-6063-42A0-8F4B-20CAFF52B0E9}" destId="{7EC10B76-9579-45EB-8E54-18E260B23A7F}" srcOrd="1" destOrd="0" presId="urn:microsoft.com/office/officeart/2005/8/layout/gear1"/>
-    <dgm:cxn modelId="{9FFF4B1F-611B-41C5-BEB4-AC0766867082}" srcId="{99AF8479-7185-4A24-B70E-2A6B4CA94085}" destId="{52CF44AB-821C-4C91-A764-9EFA1D060758}" srcOrd="0" destOrd="0" parTransId="{1A51C856-32B1-4618-8EB8-D20A5C4B36FE}" sibTransId="{931FF703-FABD-4332-950B-09219933EE0F}"/>
+    <dgm:cxn modelId="{C0B80792-D085-4C9E-AE25-5E7F62E13915}" type="presOf" srcId="{52CF44AB-821C-4C91-A764-9EFA1D060758}" destId="{CAC7DC5A-FDD8-45AD-8F08-59FDAD8470F1}" srcOrd="0" destOrd="0" presId="urn:microsoft.com/office/officeart/2005/8/layout/gear1"/>
     <dgm:cxn modelId="{59B07FB1-3156-41CF-A17F-25AABEFB8793}" type="presOf" srcId="{84F88A5E-E955-4FB4-AE6F-649A0961D9B2}" destId="{1D2AEE49-4B38-40BD-96AA-0BE4182C81AC}" srcOrd="3" destOrd="0" presId="urn:microsoft.com/office/officeart/2005/8/layout/gear1"/>
-    <dgm:cxn modelId="{0542BF6B-22D1-4C80-A4B3-98C68C5227F6}" type="presOf" srcId="{52CF44AB-821C-4C91-A764-9EFA1D060758}" destId="{7D979757-5D24-4892-B3FE-1F8C43055959}" srcOrd="1" destOrd="0" presId="urn:microsoft.com/office/officeart/2005/8/layout/gear1"/>
-    <dgm:cxn modelId="{D66B4302-1DA7-41A1-9DF0-606DF2606CD0}" type="presOf" srcId="{84F88A5E-E955-4FB4-AE6F-649A0961D9B2}" destId="{3CB0217A-BF40-4A02-8A5B-3530635C34B8}" srcOrd="0" destOrd="0" presId="urn:microsoft.com/office/officeart/2005/8/layout/gear1"/>
+    <dgm:cxn modelId="{26F5B1B4-8F0A-42F4-ABB9-F217D913CC4A}" type="presOf" srcId="{84F88A5E-E955-4FB4-AE6F-649A0961D9B2}" destId="{13900D6C-38A3-4016-B9C6-6678E714DDBA}" srcOrd="2" destOrd="0" presId="urn:microsoft.com/office/officeart/2005/8/layout/gear1"/>
+    <dgm:cxn modelId="{20B536B6-CB0F-49AF-B3FE-B4B13F1B863A}" type="presOf" srcId="{84F88A5E-E955-4FB4-AE6F-649A0961D9B2}" destId="{9F616C06-8008-4063-AE59-BE67279ED6FC}" srcOrd="1" destOrd="0" presId="urn:microsoft.com/office/officeart/2005/8/layout/gear1"/>
+    <dgm:cxn modelId="{512F5ABF-4B58-467D-A9DB-51889B870164}" type="presOf" srcId="{E6BC5261-6063-42A0-8F4B-20CAFF52B0E9}" destId="{965A70C2-C222-402C-9D6B-C45CB15CA58C}" srcOrd="0" destOrd="0" presId="urn:microsoft.com/office/officeart/2005/8/layout/gear1"/>
     <dgm:cxn modelId="{908252C1-0818-4A9B-9AAA-9577BFED1AA5}" type="presOf" srcId="{9830636E-9BAC-4317-8DF3-F617BBA2EBD2}" destId="{F8B7A15D-4F22-431D-9194-00656214C1A2}" srcOrd="0" destOrd="0" presId="urn:microsoft.com/office/officeart/2005/8/layout/gear1"/>
-    <dgm:cxn modelId="{20B536B6-CB0F-49AF-B3FE-B4B13F1B863A}" type="presOf" srcId="{84F88A5E-E955-4FB4-AE6F-649A0961D9B2}" destId="{9F616C06-8008-4063-AE59-BE67279ED6FC}" srcOrd="1" destOrd="0" presId="urn:microsoft.com/office/officeart/2005/8/layout/gear1"/>
-    <dgm:cxn modelId="{C0B80792-D085-4C9E-AE25-5E7F62E13915}" type="presOf" srcId="{52CF44AB-821C-4C91-A764-9EFA1D060758}" destId="{CAC7DC5A-FDD8-45AD-8F08-59FDAD8470F1}" srcOrd="0" destOrd="0" presId="urn:microsoft.com/office/officeart/2005/8/layout/gear1"/>
+    <dgm:cxn modelId="{BC1C4BC8-910F-4761-88F3-A930088B98F4}" type="presOf" srcId="{931FF703-FABD-4332-950B-09219933EE0F}" destId="{D9DFE31F-2C2B-437C-9251-A48D262DF4C2}" srcOrd="0" destOrd="0" presId="urn:microsoft.com/office/officeart/2005/8/layout/gear1"/>
     <dgm:cxn modelId="{70840ED8-5E52-4762-BCCD-ED62998A20EC}" type="presOf" srcId="{52CF44AB-821C-4C91-A764-9EFA1D060758}" destId="{8F4C9E98-B075-44D2-AEA8-28215C002DAF}" srcOrd="2" destOrd="0" presId="urn:microsoft.com/office/officeart/2005/8/layout/gear1"/>
-    <dgm:cxn modelId="{BC1C4BC8-910F-4761-88F3-A930088B98F4}" type="presOf" srcId="{931FF703-FABD-4332-950B-09219933EE0F}" destId="{D9DFE31F-2C2B-437C-9251-A48D262DF4C2}" srcOrd="0" destOrd="0" presId="urn:microsoft.com/office/officeart/2005/8/layout/gear1"/>
+    <dgm:cxn modelId="{10DB16DE-2F11-43CA-8A3E-1B4A16274218}" type="presOf" srcId="{3EB2DC8B-0052-40E7-98FA-521864FD8544}" destId="{67E37715-99BE-4F2A-BC8A-96C5E35723ED}" srcOrd="0" destOrd="0" presId="urn:microsoft.com/office/officeart/2005/8/layout/gear1"/>
+    <dgm:cxn modelId="{D178DCFE-0474-4F37-823D-8F34F980DA74}" srcId="{99AF8479-7185-4A24-B70E-2A6B4CA94085}" destId="{E6BC5261-6063-42A0-8F4B-20CAFF52B0E9}" srcOrd="1" destOrd="0" parTransId="{9F1B800C-504A-4728-BB6C-F75A93F77488}" sibTransId="{3EB2DC8B-0052-40E7-98FA-521864FD8544}"/>
     <dgm:cxn modelId="{CB83AF47-4A84-46FD-89D5-9787661B4CE8}" type="presParOf" srcId="{B7746EF6-B07A-472A-9662-40C793595B05}" destId="{CAC7DC5A-FDD8-45AD-8F08-59FDAD8470F1}" srcOrd="0" destOrd="0" presId="urn:microsoft.com/office/officeart/2005/8/layout/gear1"/>
     <dgm:cxn modelId="{2E046047-3FBD-431A-8357-4DC91C7997F1}" type="presParOf" srcId="{B7746EF6-B07A-472A-9662-40C793595B05}" destId="{7D979757-5D24-4892-B3FE-1F8C43055959}" srcOrd="1" destOrd="0" presId="urn:microsoft.com/office/officeart/2005/8/layout/gear1"/>
     <dgm:cxn modelId="{257A083C-0C37-4AEA-A869-854D0E261491}" type="presParOf" srcId="{B7746EF6-B07A-472A-9662-40C793595B05}" destId="{8F4C9E98-B075-44D2-AEA8-28215C002DAF}" srcOrd="2" destOrd="0" presId="urn:microsoft.com/office/officeart/2005/8/layout/gear1"/>
@@ -2554,10 +2467,9 @@
         <a:lstStyle/>
         <a:p>
           <a:r>
-            <a:rPr lang="en-US" dirty="0" smtClean="0"/>
+            <a:rPr lang="en-US" dirty="0"/>
             <a:t>Scoring</a:t>
           </a:r>
-          <a:endParaRPr lang="en-US" dirty="0"/>
         </a:p>
       </dgm:t>
     </dgm:pt>
@@ -2601,55 +2513,27 @@
         </dgm:presLayoutVars>
       </dgm:prSet>
       <dgm:spPr/>
-      <dgm:t>
-        <a:bodyPr/>
-        <a:lstStyle/>
-        <a:p>
-          <a:endParaRPr lang="en-US"/>
-        </a:p>
-      </dgm:t>
     </dgm:pt>
     <dgm:pt modelId="{7D979757-5D24-4892-B3FE-1F8C43055959}" type="pres">
       <dgm:prSet presAssocID="{52CF44AB-821C-4C91-A764-9EFA1D060758}" presName="gear1srcNode" presStyleLbl="node1" presStyleIdx="0" presStyleCnt="1"/>
       <dgm:spPr/>
-      <dgm:t>
-        <a:bodyPr/>
-        <a:lstStyle/>
-        <a:p>
-          <a:endParaRPr lang="en-US"/>
-        </a:p>
-      </dgm:t>
     </dgm:pt>
     <dgm:pt modelId="{8F4C9E98-B075-44D2-AEA8-28215C002DAF}" type="pres">
       <dgm:prSet presAssocID="{52CF44AB-821C-4C91-A764-9EFA1D060758}" presName="gear1dstNode" presStyleLbl="node1" presStyleIdx="0" presStyleCnt="1"/>
       <dgm:spPr/>
-      <dgm:t>
-        <a:bodyPr/>
-        <a:lstStyle/>
-        <a:p>
-          <a:endParaRPr lang="en-US"/>
-        </a:p>
-      </dgm:t>
     </dgm:pt>
     <dgm:pt modelId="{D9DFE31F-2C2B-437C-9251-A48D262DF4C2}" type="pres">
       <dgm:prSet presAssocID="{931FF703-FABD-4332-950B-09219933EE0F}" presName="connector1" presStyleLbl="sibTrans2D1" presStyleIdx="0" presStyleCnt="1"/>
       <dgm:spPr/>
-      <dgm:t>
-        <a:bodyPr/>
-        <a:lstStyle/>
-        <a:p>
-          <a:endParaRPr lang="en-US"/>
-        </a:p>
-      </dgm:t>
     </dgm:pt>
   </dgm:ptLst>
   <dgm:cxnLst>
+    <dgm:cxn modelId="{9FFF4B1F-611B-41C5-BEB4-AC0766867082}" srcId="{99AF8479-7185-4A24-B70E-2A6B4CA94085}" destId="{52CF44AB-821C-4C91-A764-9EFA1D060758}" srcOrd="0" destOrd="0" parTransId="{1A51C856-32B1-4618-8EB8-D20A5C4B36FE}" sibTransId="{931FF703-FABD-4332-950B-09219933EE0F}"/>
+    <dgm:cxn modelId="{3B8F9850-421D-4C7A-9854-8B5DC45C60CE}" type="presOf" srcId="{52CF44AB-821C-4C91-A764-9EFA1D060758}" destId="{CAC7DC5A-FDD8-45AD-8F08-59FDAD8470F1}" srcOrd="0" destOrd="0" presId="urn:microsoft.com/office/officeart/2005/8/layout/gear1"/>
     <dgm:cxn modelId="{C18F7965-1B10-490B-A600-7E8936FA2485}" type="presOf" srcId="{931FF703-FABD-4332-950B-09219933EE0F}" destId="{D9DFE31F-2C2B-437C-9251-A48D262DF4C2}" srcOrd="0" destOrd="0" presId="urn:microsoft.com/office/officeart/2005/8/layout/gear1"/>
+    <dgm:cxn modelId="{2B720EA9-2116-42AC-B718-1A32EAEA2A9D}" type="presOf" srcId="{99AF8479-7185-4A24-B70E-2A6B4CA94085}" destId="{B7746EF6-B07A-472A-9662-40C793595B05}" srcOrd="0" destOrd="0" presId="urn:microsoft.com/office/officeart/2005/8/layout/gear1"/>
     <dgm:cxn modelId="{5EC5BBB4-54DE-46AA-B5CF-C07401830F9D}" type="presOf" srcId="{52CF44AB-821C-4C91-A764-9EFA1D060758}" destId="{7D979757-5D24-4892-B3FE-1F8C43055959}" srcOrd="1" destOrd="0" presId="urn:microsoft.com/office/officeart/2005/8/layout/gear1"/>
     <dgm:cxn modelId="{7AFAA3BA-4331-46D5-87C5-9D144C56E13B}" type="presOf" srcId="{52CF44AB-821C-4C91-A764-9EFA1D060758}" destId="{8F4C9E98-B075-44D2-AEA8-28215C002DAF}" srcOrd="2" destOrd="0" presId="urn:microsoft.com/office/officeart/2005/8/layout/gear1"/>
-    <dgm:cxn modelId="{3B8F9850-421D-4C7A-9854-8B5DC45C60CE}" type="presOf" srcId="{52CF44AB-821C-4C91-A764-9EFA1D060758}" destId="{CAC7DC5A-FDD8-45AD-8F08-59FDAD8470F1}" srcOrd="0" destOrd="0" presId="urn:microsoft.com/office/officeart/2005/8/layout/gear1"/>
-    <dgm:cxn modelId="{2B720EA9-2116-42AC-B718-1A32EAEA2A9D}" type="presOf" srcId="{99AF8479-7185-4A24-B70E-2A6B4CA94085}" destId="{B7746EF6-B07A-472A-9662-40C793595B05}" srcOrd="0" destOrd="0" presId="urn:microsoft.com/office/officeart/2005/8/layout/gear1"/>
-    <dgm:cxn modelId="{9FFF4B1F-611B-41C5-BEB4-AC0766867082}" srcId="{99AF8479-7185-4A24-B70E-2A6B4CA94085}" destId="{52CF44AB-821C-4C91-A764-9EFA1D060758}" srcOrd="0" destOrd="0" parTransId="{1A51C856-32B1-4618-8EB8-D20A5C4B36FE}" sibTransId="{931FF703-FABD-4332-950B-09219933EE0F}"/>
     <dgm:cxn modelId="{063D12EF-119F-4B48-9F3D-379EF25351E5}" type="presParOf" srcId="{B7746EF6-B07A-472A-9662-40C793595B05}" destId="{CAC7DC5A-FDD8-45AD-8F08-59FDAD8470F1}" srcOrd="0" destOrd="0" presId="urn:microsoft.com/office/officeart/2005/8/layout/gear1"/>
     <dgm:cxn modelId="{4E380E08-8CF8-45C9-9B9C-71867944BBE9}" type="presParOf" srcId="{B7746EF6-B07A-472A-9662-40C793595B05}" destId="{7D979757-5D24-4892-B3FE-1F8C43055959}" srcOrd="1" destOrd="0" presId="urn:microsoft.com/office/officeart/2005/8/layout/gear1"/>
     <dgm:cxn modelId="{40875473-CD09-4495-A698-2D7E9FB0B298}" type="presParOf" srcId="{B7746EF6-B07A-472A-9662-40C793595B05}" destId="{8F4C9E98-B075-44D2-AEA8-28215C002DAF}" srcOrd="2" destOrd="0" presId="urn:microsoft.com/office/officeart/2005/8/layout/gear1"/>
@@ -2727,7 +2611,7 @@
         </a:bodyPr>
         <a:lstStyle/>
         <a:p>
-          <a:pPr lvl="0" algn="ctr" defTabSz="400050">
+          <a:pPr marL="0" lvl="0" indent="0" algn="ctr" defTabSz="400050">
             <a:lnSpc>
               <a:spcPct val="90000"/>
             </a:lnSpc>
@@ -2737,12 +2621,12 @@
             <a:spcAft>
               <a:spcPct val="35000"/>
             </a:spcAft>
+            <a:buNone/>
           </a:pPr>
           <a:r>
-            <a:rPr lang="en-US" sz="900" kern="1200" dirty="0" smtClean="0"/>
+            <a:rPr lang="en-US" sz="900" kern="1200" dirty="0"/>
             <a:t>Scoring</a:t>
           </a:r>
-          <a:endParaRPr lang="en-US" sz="900" kern="1200" dirty="0"/>
         </a:p>
       </dsp:txBody>
       <dsp:txXfrm>
@@ -2801,7 +2685,7 @@
         </a:bodyPr>
         <a:lstStyle/>
         <a:p>
-          <a:pPr lvl="0" algn="ctr" defTabSz="400050">
+          <a:pPr marL="0" lvl="0" indent="0" algn="ctr" defTabSz="400050">
             <a:lnSpc>
               <a:spcPct val="90000"/>
             </a:lnSpc>
@@ -2811,12 +2695,12 @@
             <a:spcAft>
               <a:spcPct val="35000"/>
             </a:spcAft>
+            <a:buNone/>
           </a:pPr>
           <a:r>
-            <a:rPr lang="en-US" sz="900" kern="1200" dirty="0" smtClean="0"/>
+            <a:rPr lang="en-US" sz="900" kern="1200" dirty="0"/>
             <a:t>Testing</a:t>
           </a:r>
-          <a:endParaRPr lang="en-US" sz="900" kern="1200" dirty="0"/>
         </a:p>
       </dsp:txBody>
       <dsp:txXfrm>
@@ -2873,7 +2757,7 @@
         </a:bodyPr>
         <a:lstStyle/>
         <a:p>
-          <a:pPr lvl="0" algn="ctr" defTabSz="400050">
+          <a:pPr marL="0" lvl="0" indent="0" algn="ctr" defTabSz="400050">
             <a:lnSpc>
               <a:spcPct val="90000"/>
             </a:lnSpc>
@@ -2883,12 +2767,12 @@
             <a:spcAft>
               <a:spcPct val="35000"/>
             </a:spcAft>
+            <a:buNone/>
           </a:pPr>
           <a:r>
-            <a:rPr lang="en-US" sz="900" kern="1200" dirty="0" smtClean="0"/>
+            <a:rPr lang="en-US" sz="900" kern="1200" dirty="0"/>
             <a:t>Training</a:t>
           </a:r>
-          <a:endParaRPr lang="en-US" sz="900" kern="1200" dirty="0"/>
         </a:p>
       </dsp:txBody>
       <dsp:txXfrm rot="-20700000">
@@ -3106,7 +2990,7 @@
         </a:bodyPr>
         <a:lstStyle/>
         <a:p>
-          <a:pPr lvl="0" algn="ctr" defTabSz="622300">
+          <a:pPr marL="0" lvl="0" indent="0" algn="ctr" defTabSz="622300">
             <a:lnSpc>
               <a:spcPct val="90000"/>
             </a:lnSpc>
@@ -3116,12 +3000,12 @@
             <a:spcAft>
               <a:spcPct val="35000"/>
             </a:spcAft>
+            <a:buNone/>
           </a:pPr>
           <a:r>
-            <a:rPr lang="en-US" sz="1400" kern="1200" dirty="0" smtClean="0"/>
+            <a:rPr lang="en-US" sz="1400" kern="1200" dirty="0"/>
             <a:t>Scoring</a:t>
           </a:r>
-          <a:endParaRPr lang="en-US" sz="1400" kern="1200" dirty="0"/>
         </a:p>
       </dsp:txBody>
       <dsp:txXfrm>
@@ -6277,7 +6161,7 @@
           <a:p>
             <a:fld id="{01A0E728-EBD8-4B40-A58B-BA562AF6985A}" type="datetimeFigureOut">
               <a:rPr lang="en-US" smtClean="0"/>
-              <a:t>4/3/2016</a:t>
+              <a:t>3/25/19</a:t>
             </a:fld>
             <a:endParaRPr lang="en-US"/>
           </a:p>
@@ -6341,38 +6225,37 @@
           <a:p>
             <a:pPr lvl="0"/>
             <a:r>
-              <a:rPr lang="en-US" smtClean="0"/>
+              <a:rPr lang="en-US"/>
               <a:t>Click to edit Master text styles</a:t>
             </a:r>
           </a:p>
           <a:p>
             <a:pPr lvl="1"/>
             <a:r>
-              <a:rPr lang="en-US" smtClean="0"/>
+              <a:rPr lang="en-US"/>
               <a:t>Second level</a:t>
             </a:r>
           </a:p>
           <a:p>
             <a:pPr lvl="2"/>
             <a:r>
-              <a:rPr lang="en-US" smtClean="0"/>
+              <a:rPr lang="en-US"/>
               <a:t>Third level</a:t>
             </a:r>
           </a:p>
           <a:p>
             <a:pPr lvl="3"/>
             <a:r>
-              <a:rPr lang="en-US" smtClean="0"/>
+              <a:rPr lang="en-US"/>
               <a:t>Fourth level</a:t>
             </a:r>
           </a:p>
           <a:p>
             <a:pPr lvl="4"/>
             <a:r>
-              <a:rPr lang="en-US" smtClean="0"/>
+              <a:rPr lang="en-US"/>
               <a:t>Fifth level</a:t>
             </a:r>
-            <a:endParaRPr lang="en-US"/>
           </a:p>
         </p:txBody>
       </p:sp>
@@ -6583,10 +6466,9 @@
           <a:lstStyle/>
           <a:p>
             <a:r>
-              <a:rPr lang="en-US" smtClean="0"/>
+              <a:rPr lang="en-US"/>
               <a:t>Click to edit Master title style</a:t>
             </a:r>
-            <a:endParaRPr lang="en-US"/>
           </a:p>
         </p:txBody>
       </p:sp>
@@ -6702,10 +6584,9 @@
           </a:lstStyle>
           <a:p>
             <a:r>
-              <a:rPr lang="en-US" smtClean="0"/>
+              <a:rPr lang="en-US"/>
               <a:t>Click to edit Master subtitle style</a:t>
             </a:r>
-            <a:endParaRPr lang="en-US"/>
           </a:p>
         </p:txBody>
       </p:sp>
@@ -6725,10 +6606,9 @@
           <a:lstStyle/>
           <a:p>
             <a:r>
-              <a:rPr lang="en-US" smtClean="0"/>
+              <a:rPr lang="en-US"/>
               <a:t>7/28/2015</a:t>
             </a:r>
-            <a:endParaRPr lang="en-US"/>
           </a:p>
         </p:txBody>
       </p:sp>
@@ -6748,10 +6628,9 @@
           <a:lstStyle/>
           <a:p>
             <a:r>
-              <a:rPr lang="en-US" smtClean="0"/>
+              <a:rPr lang="en-US"/>
               <a:t>UVA Medical System</a:t>
             </a:r>
-            <a:endParaRPr lang="en-US"/>
           </a:p>
         </p:txBody>
       </p:sp>
@@ -6824,10 +6703,9 @@
           <a:lstStyle/>
           <a:p>
             <a:r>
-              <a:rPr lang="en-US" smtClean="0"/>
+              <a:rPr lang="en-US"/>
               <a:t>Click to edit Master title style</a:t>
             </a:r>
-            <a:endParaRPr lang="en-US"/>
           </a:p>
         </p:txBody>
       </p:sp>
@@ -6848,38 +6726,37 @@
           <a:p>
             <a:pPr lvl="0"/>
             <a:r>
-              <a:rPr lang="en-US" smtClean="0"/>
+              <a:rPr lang="en-US"/>
               <a:t>Click to edit Master text styles</a:t>
             </a:r>
           </a:p>
           <a:p>
             <a:pPr lvl="1"/>
             <a:r>
-              <a:rPr lang="en-US" smtClean="0"/>
+              <a:rPr lang="en-US"/>
               <a:t>Second level</a:t>
             </a:r>
           </a:p>
           <a:p>
             <a:pPr lvl="2"/>
             <a:r>
-              <a:rPr lang="en-US" smtClean="0"/>
+              <a:rPr lang="en-US"/>
               <a:t>Third level</a:t>
             </a:r>
           </a:p>
           <a:p>
             <a:pPr lvl="3"/>
             <a:r>
-              <a:rPr lang="en-US" smtClean="0"/>
+              <a:rPr lang="en-US"/>
               <a:t>Fourth level</a:t>
             </a:r>
           </a:p>
           <a:p>
             <a:pPr lvl="4"/>
             <a:r>
-              <a:rPr lang="en-US" smtClean="0"/>
+              <a:rPr lang="en-US"/>
               <a:t>Fifth level</a:t>
             </a:r>
-            <a:endParaRPr lang="en-US"/>
           </a:p>
         </p:txBody>
       </p:sp>
@@ -6899,10 +6776,9 @@
           <a:lstStyle/>
           <a:p>
             <a:r>
-              <a:rPr lang="en-US" smtClean="0"/>
+              <a:rPr lang="en-US"/>
               <a:t>7/28/2015</a:t>
             </a:r>
-            <a:endParaRPr lang="en-US"/>
           </a:p>
         </p:txBody>
       </p:sp>
@@ -6922,10 +6798,9 @@
           <a:lstStyle/>
           <a:p>
             <a:r>
-              <a:rPr lang="en-US" smtClean="0"/>
+              <a:rPr lang="en-US"/>
               <a:t>UVA Medical System</a:t>
             </a:r>
-            <a:endParaRPr lang="en-US"/>
           </a:p>
         </p:txBody>
       </p:sp>
@@ -7003,10 +6878,9 @@
           <a:lstStyle/>
           <a:p>
             <a:r>
-              <a:rPr lang="en-US" smtClean="0"/>
+              <a:rPr lang="en-US"/>
               <a:t>Click to edit Master title style</a:t>
             </a:r>
-            <a:endParaRPr lang="en-US"/>
           </a:p>
         </p:txBody>
       </p:sp>
@@ -7032,38 +6906,37 @@
           <a:p>
             <a:pPr lvl="0"/>
             <a:r>
-              <a:rPr lang="en-US" smtClean="0"/>
+              <a:rPr lang="en-US"/>
               <a:t>Click to edit Master text styles</a:t>
             </a:r>
           </a:p>
           <a:p>
             <a:pPr lvl="1"/>
             <a:r>
-              <a:rPr lang="en-US" smtClean="0"/>
+              <a:rPr lang="en-US"/>
               <a:t>Second level</a:t>
             </a:r>
           </a:p>
           <a:p>
             <a:pPr lvl="2"/>
             <a:r>
-              <a:rPr lang="en-US" smtClean="0"/>
+              <a:rPr lang="en-US"/>
               <a:t>Third level</a:t>
             </a:r>
           </a:p>
           <a:p>
             <a:pPr lvl="3"/>
             <a:r>
-              <a:rPr lang="en-US" smtClean="0"/>
+              <a:rPr lang="en-US"/>
               <a:t>Fourth level</a:t>
             </a:r>
           </a:p>
           <a:p>
             <a:pPr lvl="4"/>
             <a:r>
-              <a:rPr lang="en-US" smtClean="0"/>
+              <a:rPr lang="en-US"/>
               <a:t>Fifth level</a:t>
             </a:r>
-            <a:endParaRPr lang="en-US"/>
           </a:p>
         </p:txBody>
       </p:sp>
@@ -7083,10 +6956,9 @@
           <a:lstStyle/>
           <a:p>
             <a:r>
-              <a:rPr lang="en-US" smtClean="0"/>
+              <a:rPr lang="en-US"/>
               <a:t>7/28/2015</a:t>
             </a:r>
-            <a:endParaRPr lang="en-US"/>
           </a:p>
         </p:txBody>
       </p:sp>
@@ -7106,10 +6978,9 @@
           <a:lstStyle/>
           <a:p>
             <a:r>
-              <a:rPr lang="en-US" smtClean="0"/>
+              <a:rPr lang="en-US"/>
               <a:t>UVA Medical System</a:t>
             </a:r>
-            <a:endParaRPr lang="en-US"/>
           </a:p>
         </p:txBody>
       </p:sp>
@@ -7182,10 +7053,9 @@
           <a:lstStyle/>
           <a:p>
             <a:r>
-              <a:rPr lang="en-US" smtClean="0"/>
+              <a:rPr lang="en-US"/>
               <a:t>Click to edit Master title style</a:t>
             </a:r>
-            <a:endParaRPr lang="en-US"/>
           </a:p>
         </p:txBody>
       </p:sp>
@@ -7206,38 +7076,37 @@
           <a:p>
             <a:pPr lvl="0"/>
             <a:r>
-              <a:rPr lang="en-US" smtClean="0"/>
+              <a:rPr lang="en-US"/>
               <a:t>Click to edit Master text styles</a:t>
             </a:r>
           </a:p>
           <a:p>
             <a:pPr lvl="1"/>
             <a:r>
-              <a:rPr lang="en-US" smtClean="0"/>
+              <a:rPr lang="en-US"/>
               <a:t>Second level</a:t>
             </a:r>
           </a:p>
           <a:p>
             <a:pPr lvl="2"/>
             <a:r>
-              <a:rPr lang="en-US" smtClean="0"/>
+              <a:rPr lang="en-US"/>
               <a:t>Third level</a:t>
             </a:r>
           </a:p>
           <a:p>
             <a:pPr lvl="3"/>
             <a:r>
-              <a:rPr lang="en-US" smtClean="0"/>
+              <a:rPr lang="en-US"/>
               <a:t>Fourth level</a:t>
             </a:r>
           </a:p>
           <a:p>
             <a:pPr lvl="4"/>
             <a:r>
-              <a:rPr lang="en-US" smtClean="0"/>
+              <a:rPr lang="en-US"/>
               <a:t>Fifth level</a:t>
             </a:r>
-            <a:endParaRPr lang="en-US"/>
           </a:p>
         </p:txBody>
       </p:sp>
@@ -7257,10 +7126,9 @@
           <a:lstStyle/>
           <a:p>
             <a:r>
-              <a:rPr lang="en-US" smtClean="0"/>
+              <a:rPr lang="en-US"/>
               <a:t>7/28/2015</a:t>
             </a:r>
-            <a:endParaRPr lang="en-US"/>
           </a:p>
         </p:txBody>
       </p:sp>
@@ -7280,10 +7148,9 @@
           <a:lstStyle/>
           <a:p>
             <a:r>
-              <a:rPr lang="en-US" smtClean="0"/>
+              <a:rPr lang="en-US"/>
               <a:t>UVA Medical System</a:t>
             </a:r>
-            <a:endParaRPr lang="en-US"/>
           </a:p>
         </p:txBody>
       </p:sp>
@@ -7365,10 +7232,9 @@
           </a:lstStyle>
           <a:p>
             <a:r>
-              <a:rPr lang="en-US" smtClean="0"/>
+              <a:rPr lang="en-US"/>
               <a:t>Click to edit Master title style</a:t>
             </a:r>
-            <a:endParaRPr lang="en-US"/>
           </a:p>
         </p:txBody>
       </p:sp>
@@ -7485,7 +7351,7 @@
           <a:p>
             <a:pPr lvl="0"/>
             <a:r>
-              <a:rPr lang="en-US" smtClean="0"/>
+              <a:rPr lang="en-US"/>
               <a:t>Click to edit Master text styles</a:t>
             </a:r>
           </a:p>
@@ -7507,10 +7373,9 @@
           <a:lstStyle/>
           <a:p>
             <a:r>
-              <a:rPr lang="en-US" smtClean="0"/>
+              <a:rPr lang="en-US"/>
               <a:t>7/28/2015</a:t>
             </a:r>
-            <a:endParaRPr lang="en-US"/>
           </a:p>
         </p:txBody>
       </p:sp>
@@ -7530,10 +7395,9 @@
           <a:lstStyle/>
           <a:p>
             <a:r>
-              <a:rPr lang="en-US" smtClean="0"/>
+              <a:rPr lang="en-US"/>
               <a:t>UVA Medical System</a:t>
             </a:r>
-            <a:endParaRPr lang="en-US"/>
           </a:p>
         </p:txBody>
       </p:sp>
@@ -7606,10 +7470,9 @@
           <a:lstStyle/>
           <a:p>
             <a:r>
-              <a:rPr lang="en-US" smtClean="0"/>
+              <a:rPr lang="en-US"/>
               <a:t>Click to edit Master title style</a:t>
             </a:r>
-            <a:endParaRPr lang="en-US"/>
           </a:p>
         </p:txBody>
       </p:sp>
@@ -7663,38 +7526,37 @@
           <a:p>
             <a:pPr lvl="0"/>
             <a:r>
-              <a:rPr lang="en-US" smtClean="0"/>
+              <a:rPr lang="en-US"/>
               <a:t>Click to edit Master text styles</a:t>
             </a:r>
           </a:p>
           <a:p>
             <a:pPr lvl="1"/>
             <a:r>
-              <a:rPr lang="en-US" smtClean="0"/>
+              <a:rPr lang="en-US"/>
               <a:t>Second level</a:t>
             </a:r>
           </a:p>
           <a:p>
             <a:pPr lvl="2"/>
             <a:r>
-              <a:rPr lang="en-US" smtClean="0"/>
+              <a:rPr lang="en-US"/>
               <a:t>Third level</a:t>
             </a:r>
           </a:p>
           <a:p>
             <a:pPr lvl="3"/>
             <a:r>
-              <a:rPr lang="en-US" smtClean="0"/>
+              <a:rPr lang="en-US"/>
               <a:t>Fourth level</a:t>
             </a:r>
           </a:p>
           <a:p>
             <a:pPr lvl="4"/>
             <a:r>
-              <a:rPr lang="en-US" smtClean="0"/>
+              <a:rPr lang="en-US"/>
               <a:t>Fifth level</a:t>
             </a:r>
-            <a:endParaRPr lang="en-US"/>
           </a:p>
         </p:txBody>
       </p:sp>
@@ -7748,38 +7610,37 @@
           <a:p>
             <a:pPr lvl="0"/>
             <a:r>
-              <a:rPr lang="en-US" smtClean="0"/>
+              <a:rPr lang="en-US"/>
               <a:t>Click to edit Master text styles</a:t>
             </a:r>
           </a:p>
           <a:p>
             <a:pPr lvl="1"/>
             <a:r>
-              <a:rPr lang="en-US" smtClean="0"/>
+              <a:rPr lang="en-US"/>
               <a:t>Second level</a:t>
             </a:r>
           </a:p>
           <a:p>
             <a:pPr lvl="2"/>
             <a:r>
-              <a:rPr lang="en-US" smtClean="0"/>
+              <a:rPr lang="en-US"/>
               <a:t>Third level</a:t>
             </a:r>
           </a:p>
           <a:p>
             <a:pPr lvl="3"/>
             <a:r>
-              <a:rPr lang="en-US" smtClean="0"/>
+              <a:rPr lang="en-US"/>
               <a:t>Fourth level</a:t>
             </a:r>
           </a:p>
           <a:p>
             <a:pPr lvl="4"/>
             <a:r>
-              <a:rPr lang="en-US" smtClean="0"/>
+              <a:rPr lang="en-US"/>
               <a:t>Fifth level</a:t>
             </a:r>
-            <a:endParaRPr lang="en-US"/>
           </a:p>
         </p:txBody>
       </p:sp>
@@ -7799,10 +7660,9 @@
           <a:lstStyle/>
           <a:p>
             <a:r>
-              <a:rPr lang="en-US" smtClean="0"/>
+              <a:rPr lang="en-US"/>
               <a:t>7/28/2015</a:t>
             </a:r>
-            <a:endParaRPr lang="en-US"/>
           </a:p>
         </p:txBody>
       </p:sp>
@@ -7822,10 +7682,9 @@
           <a:lstStyle/>
           <a:p>
             <a:r>
-              <a:rPr lang="en-US" smtClean="0"/>
+              <a:rPr lang="en-US"/>
               <a:t>UVA Medical System</a:t>
             </a:r>
-            <a:endParaRPr lang="en-US"/>
           </a:p>
         </p:txBody>
       </p:sp>
@@ -7902,10 +7761,9 @@
           </a:lstStyle>
           <a:p>
             <a:r>
-              <a:rPr lang="en-US" smtClean="0"/>
+              <a:rPr lang="en-US"/>
               <a:t>Click to edit Master title style</a:t>
             </a:r>
-            <a:endParaRPr lang="en-US"/>
           </a:p>
         </p:txBody>
       </p:sp>
@@ -7968,7 +7826,7 @@
           <a:p>
             <a:pPr lvl="0"/>
             <a:r>
-              <a:rPr lang="en-US" smtClean="0"/>
+              <a:rPr lang="en-US"/>
               <a:t>Click to edit Master text styles</a:t>
             </a:r>
           </a:p>
@@ -8024,38 +7882,37 @@
           <a:p>
             <a:pPr lvl="0"/>
             <a:r>
-              <a:rPr lang="en-US" smtClean="0"/>
+              <a:rPr lang="en-US"/>
               <a:t>Click to edit Master text styles</a:t>
             </a:r>
           </a:p>
           <a:p>
             <a:pPr lvl="1"/>
             <a:r>
-              <a:rPr lang="en-US" smtClean="0"/>
+              <a:rPr lang="en-US"/>
               <a:t>Second level</a:t>
             </a:r>
           </a:p>
           <a:p>
             <a:pPr lvl="2"/>
             <a:r>
-              <a:rPr lang="en-US" smtClean="0"/>
+              <a:rPr lang="en-US"/>
               <a:t>Third level</a:t>
             </a:r>
           </a:p>
           <a:p>
             <a:pPr lvl="3"/>
             <a:r>
-              <a:rPr lang="en-US" smtClean="0"/>
+              <a:rPr lang="en-US"/>
               <a:t>Fourth level</a:t>
             </a:r>
           </a:p>
           <a:p>
             <a:pPr lvl="4"/>
             <a:r>
-              <a:rPr lang="en-US" smtClean="0"/>
+              <a:rPr lang="en-US"/>
               <a:t>Fifth level</a:t>
             </a:r>
-            <a:endParaRPr lang="en-US"/>
           </a:p>
         </p:txBody>
       </p:sp>
@@ -8118,7 +7975,7 @@
           <a:p>
             <a:pPr lvl="0"/>
             <a:r>
-              <a:rPr lang="en-US" smtClean="0"/>
+              <a:rPr lang="en-US"/>
               <a:t>Click to edit Master text styles</a:t>
             </a:r>
           </a:p>
@@ -8174,38 +8031,37 @@
           <a:p>
             <a:pPr lvl="0"/>
             <a:r>
-              <a:rPr lang="en-US" smtClean="0"/>
+              <a:rPr lang="en-US"/>
               <a:t>Click to edit Master text styles</a:t>
             </a:r>
           </a:p>
           <a:p>
             <a:pPr lvl="1"/>
             <a:r>
-              <a:rPr lang="en-US" smtClean="0"/>
+              <a:rPr lang="en-US"/>
               <a:t>Second level</a:t>
             </a:r>
           </a:p>
           <a:p>
             <a:pPr lvl="2"/>
             <a:r>
-              <a:rPr lang="en-US" smtClean="0"/>
+              <a:rPr lang="en-US"/>
               <a:t>Third level</a:t>
             </a:r>
           </a:p>
           <a:p>
             <a:pPr lvl="3"/>
             <a:r>
-              <a:rPr lang="en-US" smtClean="0"/>
+              <a:rPr lang="en-US"/>
               <a:t>Fourth level</a:t>
             </a:r>
           </a:p>
           <a:p>
             <a:pPr lvl="4"/>
             <a:r>
-              <a:rPr lang="en-US" smtClean="0"/>
+              <a:rPr lang="en-US"/>
               <a:t>Fifth level</a:t>
             </a:r>
-            <a:endParaRPr lang="en-US"/>
           </a:p>
         </p:txBody>
       </p:sp>
@@ -8225,10 +8081,9 @@
           <a:lstStyle/>
           <a:p>
             <a:r>
-              <a:rPr lang="en-US" smtClean="0"/>
+              <a:rPr lang="en-US"/>
               <a:t>7/28/2015</a:t>
             </a:r>
-            <a:endParaRPr lang="en-US"/>
           </a:p>
         </p:txBody>
       </p:sp>
@@ -8248,10 +8103,9 @@
           <a:lstStyle/>
           <a:p>
             <a:r>
-              <a:rPr lang="en-US" smtClean="0"/>
+              <a:rPr lang="en-US"/>
               <a:t>UVA Medical System</a:t>
             </a:r>
-            <a:endParaRPr lang="en-US"/>
           </a:p>
         </p:txBody>
       </p:sp>
@@ -8324,10 +8178,9 @@
           <a:lstStyle/>
           <a:p>
             <a:r>
-              <a:rPr lang="en-US" smtClean="0"/>
+              <a:rPr lang="en-US"/>
               <a:t>Click to edit Master title style</a:t>
             </a:r>
-            <a:endParaRPr lang="en-US"/>
           </a:p>
         </p:txBody>
       </p:sp>
@@ -8347,10 +8200,9 @@
           <a:lstStyle/>
           <a:p>
             <a:r>
-              <a:rPr lang="en-US" smtClean="0"/>
+              <a:rPr lang="en-US"/>
               <a:t>7/28/2015</a:t>
             </a:r>
-            <a:endParaRPr lang="en-US"/>
           </a:p>
         </p:txBody>
       </p:sp>
@@ -8370,10 +8222,9 @@
           <a:lstStyle/>
           <a:p>
             <a:r>
-              <a:rPr lang="en-US" smtClean="0"/>
+              <a:rPr lang="en-US"/>
               <a:t>UVA Medical System</a:t>
             </a:r>
-            <a:endParaRPr lang="en-US"/>
           </a:p>
         </p:txBody>
       </p:sp>
@@ -8446,10 +8297,9 @@
           <a:lstStyle/>
           <a:p>
             <a:r>
-              <a:rPr lang="en-US" smtClean="0"/>
+              <a:rPr lang="en-US"/>
               <a:t>7/28/2015</a:t>
             </a:r>
-            <a:endParaRPr lang="en-US"/>
           </a:p>
         </p:txBody>
       </p:sp>
@@ -8469,10 +8319,9 @@
           <a:lstStyle/>
           <a:p>
             <a:r>
-              <a:rPr lang="en-US" smtClean="0"/>
+              <a:rPr lang="en-US"/>
               <a:t>UVA Medical System</a:t>
             </a:r>
-            <a:endParaRPr lang="en-US"/>
           </a:p>
         </p:txBody>
       </p:sp>
@@ -8554,10 +8403,9 @@
           </a:lstStyle>
           <a:p>
             <a:r>
-              <a:rPr lang="en-US" smtClean="0"/>
+              <a:rPr lang="en-US"/>
               <a:t>Click to edit Master title style</a:t>
             </a:r>
-            <a:endParaRPr lang="en-US"/>
           </a:p>
         </p:txBody>
       </p:sp>
@@ -8611,38 +8459,37 @@
           <a:p>
             <a:pPr lvl="0"/>
             <a:r>
-              <a:rPr lang="en-US" smtClean="0"/>
+              <a:rPr lang="en-US"/>
               <a:t>Click to edit Master text styles</a:t>
             </a:r>
           </a:p>
           <a:p>
             <a:pPr lvl="1"/>
             <a:r>
-              <a:rPr lang="en-US" smtClean="0"/>
+              <a:rPr lang="en-US"/>
               <a:t>Second level</a:t>
             </a:r>
           </a:p>
           <a:p>
             <a:pPr lvl="2"/>
             <a:r>
-              <a:rPr lang="en-US" smtClean="0"/>
+              <a:rPr lang="en-US"/>
               <a:t>Third level</a:t>
             </a:r>
           </a:p>
           <a:p>
             <a:pPr lvl="3"/>
             <a:r>
-              <a:rPr lang="en-US" smtClean="0"/>
+              <a:rPr lang="en-US"/>
               <a:t>Fourth level</a:t>
             </a:r>
           </a:p>
           <a:p>
             <a:pPr lvl="4"/>
             <a:r>
-              <a:rPr lang="en-US" smtClean="0"/>
+              <a:rPr lang="en-US"/>
               <a:t>Fifth level</a:t>
             </a:r>
-            <a:endParaRPr lang="en-US"/>
           </a:p>
         </p:txBody>
       </p:sp>
@@ -8705,7 +8552,7 @@
           <a:p>
             <a:pPr lvl="0"/>
             <a:r>
-              <a:rPr lang="en-US" smtClean="0"/>
+              <a:rPr lang="en-US"/>
               <a:t>Click to edit Master text styles</a:t>
             </a:r>
           </a:p>
@@ -8727,10 +8574,9 @@
           <a:lstStyle/>
           <a:p>
             <a:r>
-              <a:rPr lang="en-US" smtClean="0"/>
+              <a:rPr lang="en-US"/>
               <a:t>7/28/2015</a:t>
             </a:r>
-            <a:endParaRPr lang="en-US"/>
           </a:p>
         </p:txBody>
       </p:sp>
@@ -8750,10 +8596,9 @@
           <a:lstStyle/>
           <a:p>
             <a:r>
-              <a:rPr lang="en-US" smtClean="0"/>
+              <a:rPr lang="en-US"/>
               <a:t>UVA Medical System</a:t>
             </a:r>
-            <a:endParaRPr lang="en-US"/>
           </a:p>
         </p:txBody>
       </p:sp>
@@ -8835,10 +8680,9 @@
           </a:lstStyle>
           <a:p>
             <a:r>
-              <a:rPr lang="en-US" smtClean="0"/>
+              <a:rPr lang="en-US"/>
               <a:t>Click to edit Master title style</a:t>
             </a:r>
-            <a:endParaRPr lang="en-US"/>
           </a:p>
         </p:txBody>
       </p:sp>
@@ -8962,7 +8806,7 @@
           <a:p>
             <a:pPr lvl="0"/>
             <a:r>
-              <a:rPr lang="en-US" smtClean="0"/>
+              <a:rPr lang="en-US"/>
               <a:t>Click to edit Master text styles</a:t>
             </a:r>
           </a:p>
@@ -8984,10 +8828,9 @@
           <a:lstStyle/>
           <a:p>
             <a:r>
-              <a:rPr lang="en-US" smtClean="0"/>
+              <a:rPr lang="en-US"/>
               <a:t>7/28/2015</a:t>
             </a:r>
-            <a:endParaRPr lang="en-US"/>
           </a:p>
         </p:txBody>
       </p:sp>
@@ -9007,10 +8850,9 @@
           <a:lstStyle/>
           <a:p>
             <a:r>
-              <a:rPr lang="en-US" smtClean="0"/>
+              <a:rPr lang="en-US"/>
               <a:t>UVA Medical System</a:t>
             </a:r>
-            <a:endParaRPr lang="en-US"/>
           </a:p>
         </p:txBody>
       </p:sp>
@@ -9098,10 +8940,9 @@
           <a:lstStyle/>
           <a:p>
             <a:r>
-              <a:rPr lang="en-US" smtClean="0"/>
+              <a:rPr lang="en-US"/>
               <a:t>Click to edit Master title style</a:t>
             </a:r>
-            <a:endParaRPr lang="en-US"/>
           </a:p>
         </p:txBody>
       </p:sp>
@@ -9132,38 +8973,37 @@
           <a:p>
             <a:pPr lvl="0"/>
             <a:r>
-              <a:rPr lang="en-US" smtClean="0"/>
+              <a:rPr lang="en-US"/>
               <a:t>Click to edit Master text styles</a:t>
             </a:r>
           </a:p>
           <a:p>
             <a:pPr lvl="1"/>
             <a:r>
-              <a:rPr lang="en-US" smtClean="0"/>
+              <a:rPr lang="en-US"/>
               <a:t>Second level</a:t>
             </a:r>
           </a:p>
           <a:p>
             <a:pPr lvl="2"/>
             <a:r>
-              <a:rPr lang="en-US" smtClean="0"/>
+              <a:rPr lang="en-US"/>
               <a:t>Third level</a:t>
             </a:r>
           </a:p>
           <a:p>
             <a:pPr lvl="3"/>
             <a:r>
-              <a:rPr lang="en-US" smtClean="0"/>
+              <a:rPr lang="en-US"/>
               <a:t>Fourth level</a:t>
             </a:r>
           </a:p>
           <a:p>
             <a:pPr lvl="4"/>
             <a:r>
-              <a:rPr lang="en-US" smtClean="0"/>
+              <a:rPr lang="en-US"/>
               <a:t>Fifth level</a:t>
             </a:r>
-            <a:endParaRPr lang="en-US"/>
           </a:p>
         </p:txBody>
       </p:sp>
@@ -9201,10 +9041,9 @@
           </a:lstStyle>
           <a:p>
             <a:r>
-              <a:rPr lang="en-US" smtClean="0"/>
+              <a:rPr lang="en-US"/>
               <a:t>7/28/2015</a:t>
             </a:r>
-            <a:endParaRPr lang="en-US"/>
           </a:p>
         </p:txBody>
       </p:sp>
@@ -9242,10 +9081,9 @@
           </a:lstStyle>
           <a:p>
             <a:r>
-              <a:rPr lang="en-US" smtClean="0"/>
+              <a:rPr lang="en-US"/>
               <a:t>UVA Medical System</a:t>
             </a:r>
-            <a:endParaRPr lang="en-US"/>
           </a:p>
         </p:txBody>
       </p:sp>
@@ -9598,10 +9436,9 @@
           <a:lstStyle/>
           <a:p>
             <a:r>
-              <a:rPr lang="en-US" dirty="0" smtClean="0"/>
+              <a:rPr lang="en-US" dirty="0"/>
               <a:t>Relative Readmission Risk Monitor</a:t>
             </a:r>
-            <a:endParaRPr lang="en-US" dirty="0"/>
           </a:p>
         </p:txBody>
       </p:sp>
@@ -9621,29 +9458,29 @@
           <a:lstStyle/>
           <a:p>
             <a:r>
-              <a:rPr lang="en-US" dirty="0" smtClean="0"/>
+              <a:rPr lang="en-US" dirty="0"/>
               <a:t>Robert </a:t>
             </a:r>
             <a:r>
-              <a:rPr lang="en-US" dirty="0" err="1" smtClean="0"/>
+              <a:rPr lang="en-US" dirty="0" err="1"/>
               <a:t>Yerex</a:t>
             </a:r>
             <a:r>
-              <a:rPr lang="en-US" dirty="0" smtClean="0"/>
+              <a:rPr lang="en-US" dirty="0"/>
               <a:t>, Ph.D.</a:t>
             </a:r>
             <a:br>
-              <a:rPr lang="en-US" dirty="0" smtClean="0"/>
+              <a:rPr lang="en-US" dirty="0"/>
             </a:br>
             <a:r>
-              <a:rPr lang="en-US" dirty="0" smtClean="0"/>
+              <a:rPr lang="en-US" dirty="0"/>
               <a:t>Senior Data Scientist</a:t>
             </a:r>
             <a:br>
-              <a:rPr lang="en-US" dirty="0" smtClean="0"/>
+              <a:rPr lang="en-US" dirty="0"/>
             </a:br>
             <a:r>
-              <a:rPr lang="en-US" dirty="0" smtClean="0"/>
+              <a:rPr lang="en-US" dirty="0"/>
               <a:t>08/05/2015</a:t>
             </a:r>
           </a:p>
@@ -9695,10 +9532,9 @@
           <a:lstStyle/>
           <a:p>
             <a:r>
-              <a:rPr lang="en-US" dirty="0" smtClean="0"/>
+              <a:rPr lang="en-US" dirty="0"/>
               <a:t>Data – Medical History View </a:t>
             </a:r>
-            <a:endParaRPr lang="en-US" dirty="0"/>
           </a:p>
         </p:txBody>
       </p:sp>
@@ -9718,10 +9554,9 @@
           <a:lstStyle/>
           <a:p>
             <a:r>
-              <a:rPr lang="en-US" smtClean="0"/>
+              <a:rPr lang="en-US"/>
               <a:t>7/28/2015</a:t>
             </a:r>
-            <a:endParaRPr lang="en-US"/>
           </a:p>
         </p:txBody>
       </p:sp>
@@ -9741,10 +9576,9 @@
           <a:lstStyle/>
           <a:p>
             <a:r>
-              <a:rPr lang="en-US" smtClean="0"/>
+              <a:rPr lang="en-US"/>
               <a:t>UVA Medical System</a:t>
             </a:r>
-            <a:endParaRPr lang="en-US"/>
           </a:p>
         </p:txBody>
       </p:sp>
@@ -9871,10 +9705,9 @@
           <a:lstStyle/>
           <a:p>
             <a:r>
-              <a:rPr lang="en-US" dirty="0" smtClean="0"/>
+              <a:rPr lang="en-US" dirty="0"/>
               <a:t>Modeling</a:t>
             </a:r>
-            <a:endParaRPr lang="en-US" dirty="0"/>
           </a:p>
         </p:txBody>
       </p:sp>
@@ -9899,13 +9732,13 @@
           <a:lstStyle/>
           <a:p>
             <a:r>
-              <a:rPr lang="en-US" dirty="0" smtClean="0"/>
+              <a:rPr lang="en-US" dirty="0"/>
               <a:t>Trade off between predictive accuracy and model interpretability</a:t>
             </a:r>
           </a:p>
           <a:p>
             <a:r>
-              <a:rPr lang="en-US" dirty="0" smtClean="0"/>
+              <a:rPr lang="en-US" dirty="0"/>
               <a:t>Algorithmic / Statistical Learning based models are more accurate, less interpretable</a:t>
             </a:r>
           </a:p>
@@ -9927,10 +9760,9 @@
           <a:lstStyle/>
           <a:p>
             <a:r>
-              <a:rPr lang="en-US" smtClean="0"/>
+              <a:rPr lang="en-US"/>
               <a:t>7/28/2015</a:t>
             </a:r>
-            <a:endParaRPr lang="en-US"/>
           </a:p>
         </p:txBody>
       </p:sp>
@@ -9950,10 +9782,9 @@
           <a:lstStyle/>
           <a:p>
             <a:r>
-              <a:rPr lang="en-US" smtClean="0"/>
+              <a:rPr lang="en-US"/>
               <a:t>UVA Medical System</a:t>
             </a:r>
-            <a:endParaRPr lang="en-US"/>
           </a:p>
         </p:txBody>
       </p:sp>
@@ -10043,7 +9874,7 @@
           <a:p>
             <a:pPr algn="ctr"/>
             <a:r>
-              <a:rPr lang="en-US" dirty="0" smtClean="0">
+              <a:rPr lang="en-US" dirty="0">
                 <a:ln w="0"/>
                 <a:solidFill>
                   <a:schemeClr val="tx1"/>
@@ -10125,7 +9956,7 @@
           <a:p>
             <a:pPr algn="ctr"/>
             <a:r>
-              <a:rPr lang="en-US" dirty="0" smtClean="0">
+              <a:rPr lang="en-US" dirty="0">
                 <a:ln w="0"/>
                 <a:solidFill>
                   <a:schemeClr val="tx1"/>
@@ -10167,10 +9998,9 @@
           <a:lstStyle/>
           <a:p>
             <a:r>
-              <a:rPr lang="en-US" dirty="0" smtClean="0"/>
+              <a:rPr lang="en-US" dirty="0"/>
               <a:t>Human Expert   Logistic Regression       Random Forest	SVN	NN</a:t>
             </a:r>
-            <a:endParaRPr lang="en-US" dirty="0"/>
           </a:p>
         </p:txBody>
       </p:sp>
@@ -10220,10 +10050,9 @@
           <a:lstStyle/>
           <a:p>
             <a:r>
-              <a:rPr lang="en-US" dirty="0" smtClean="0"/>
+              <a:rPr lang="en-US" dirty="0"/>
               <a:t>Feature Engineering</a:t>
             </a:r>
-            <a:endParaRPr lang="en-US" dirty="0"/>
           </a:p>
         </p:txBody>
       </p:sp>
@@ -10245,48 +10074,47 @@
           <a:lstStyle/>
           <a:p>
             <a:r>
-              <a:rPr lang="en-US" dirty="0" smtClean="0"/>
+              <a:rPr lang="en-US" dirty="0"/>
               <a:t>Basic Features:</a:t>
             </a:r>
           </a:p>
           <a:p>
             <a:pPr lvl="1"/>
             <a:r>
-              <a:rPr lang="en-US" dirty="0" smtClean="0"/>
+              <a:rPr lang="en-US" dirty="0"/>
               <a:t>Demographics, utilization, diagnostic history</a:t>
             </a:r>
-            <a:endParaRPr lang="en-US" dirty="0"/>
-          </a:p>
-          <a:p>
-            <a:r>
-              <a:rPr lang="en-US" dirty="0" smtClean="0"/>
+          </a:p>
+          <a:p>
+            <a:r>
+              <a:rPr lang="en-US" dirty="0"/>
               <a:t>Additional Features:</a:t>
             </a:r>
           </a:p>
           <a:p>
             <a:pPr lvl="1"/>
             <a:r>
-              <a:rPr lang="en-US" dirty="0" smtClean="0"/>
+              <a:rPr lang="en-US" dirty="0"/>
               <a:t>Socioeconomic (median income, education), accessibility of care (distance to PCP, density of care facilities/practitioners)</a:t>
             </a:r>
           </a:p>
           <a:p>
             <a:r>
-              <a:rPr lang="en-US" dirty="0" smtClean="0"/>
+              <a:rPr lang="en-US" dirty="0"/>
               <a:t>Engineered Features:</a:t>
             </a:r>
           </a:p>
           <a:p>
             <a:pPr lvl="1"/>
             <a:r>
-              <a:rPr lang="en-US" dirty="0" smtClean="0"/>
+              <a:rPr lang="en-US" dirty="0"/>
               <a:t>Dimensionality reduction (combinations of ICD-9 codes), </a:t>
             </a:r>
           </a:p>
           <a:p>
             <a:pPr lvl="1"/>
             <a:r>
-              <a:rPr lang="en-US" dirty="0" smtClean="0"/>
+              <a:rPr lang="en-US" dirty="0"/>
               <a:t>Pathway features (complexity of discharge sequence)</a:t>
             </a:r>
           </a:p>
@@ -10308,10 +10136,9 @@
           <a:lstStyle/>
           <a:p>
             <a:r>
-              <a:rPr lang="en-US" smtClean="0"/>
+              <a:rPr lang="en-US"/>
               <a:t>7/28/2015</a:t>
             </a:r>
-            <a:endParaRPr lang="en-US"/>
           </a:p>
         </p:txBody>
       </p:sp>
@@ -10331,10 +10158,9 @@
           <a:lstStyle/>
           <a:p>
             <a:r>
-              <a:rPr lang="en-US" smtClean="0"/>
+              <a:rPr lang="en-US"/>
               <a:t>UVA Medical System</a:t>
             </a:r>
-            <a:endParaRPr lang="en-US"/>
           </a:p>
         </p:txBody>
       </p:sp>
@@ -10407,10 +10233,9 @@
           <a:lstStyle/>
           <a:p>
             <a:r>
-              <a:rPr lang="en-US" dirty="0" smtClean="0"/>
+              <a:rPr lang="en-US" dirty="0"/>
               <a:t>Discharge Pathways</a:t>
             </a:r>
-            <a:endParaRPr lang="en-US" dirty="0"/>
           </a:p>
         </p:txBody>
       </p:sp>
@@ -10430,10 +10255,9 @@
           <a:lstStyle/>
           <a:p>
             <a:r>
-              <a:rPr lang="en-US" smtClean="0"/>
+              <a:rPr lang="en-US"/>
               <a:t>7/28/2015</a:t>
             </a:r>
-            <a:endParaRPr lang="en-US"/>
           </a:p>
         </p:txBody>
       </p:sp>
@@ -10453,10 +10277,9 @@
           <a:lstStyle/>
           <a:p>
             <a:r>
-              <a:rPr lang="en-US" smtClean="0"/>
+              <a:rPr lang="en-US"/>
               <a:t>UVA Medical System</a:t>
             </a:r>
-            <a:endParaRPr lang="en-US"/>
           </a:p>
         </p:txBody>
       </p:sp>
@@ -10505,16 +10328,12 @@
           <a:lstStyle/>
           <a:p>
             <a:r>
-              <a:rPr lang="en-US" sz="1200" baseline="30000" dirty="0" smtClean="0"/>
+              <a:rPr lang="en-US" sz="1200" baseline="30000" dirty="0"/>
               <a:t>1</a:t>
             </a:r>
             <a:r>
-              <a:rPr lang="en-US" sz="1200" dirty="0" smtClean="0"/>
-              <a:t> Coleman</a:t>
-            </a:r>
-            <a:r>
               <a:rPr lang="en-US" sz="1200" dirty="0"/>
-              <a:t>, E. A., Min, S., </a:t>
+              <a:t> Coleman, E. A., Min, S., </a:t>
             </a:r>
             <a:r>
               <a:rPr lang="en-US" sz="1200" dirty="0" err="1"/>
@@ -10530,22 +10349,14 @@
             </a:r>
             <a:r>
               <a:rPr lang="en-US" sz="1200" dirty="0"/>
-              <a:t> Care Transitions: Patterns, Complications, and </a:t>
-            </a:r>
-            <a:r>
-              <a:rPr lang="en-US" sz="1200" dirty="0" smtClean="0"/>
-              <a:t>Risk</a:t>
+              <a:t> Care Transitions: Patterns, Complications, and Risk</a:t>
             </a:r>
             <a:br>
-              <a:rPr lang="en-US" sz="1200" dirty="0" smtClean="0"/>
+              <a:rPr lang="en-US" sz="1200" dirty="0"/>
             </a:br>
             <a:r>
-              <a:rPr lang="en-US" sz="1200" dirty="0" smtClean="0"/>
-              <a:t>   Identification</a:t>
-            </a:r>
-            <a:r>
               <a:rPr lang="en-US" sz="1200" dirty="0"/>
-              <a:t>. Health </a:t>
+              <a:t>   Identification. Health </a:t>
             </a:r>
             <a:r>
               <a:rPr lang="en-US" sz="1200" dirty="0" err="1"/>
@@ -10595,10 +10406,9 @@
           <a:p>
             <a:pPr algn="ctr"/>
             <a:r>
-              <a:rPr lang="en-US" sz="1000" dirty="0" smtClean="0"/>
+              <a:rPr lang="en-US" sz="1000" dirty="0"/>
               <a:t>Hospital</a:t>
             </a:r>
-            <a:endParaRPr lang="en-US" sz="1000" dirty="0"/>
           </a:p>
         </p:txBody>
       </p:sp>
@@ -10639,10 +10449,9 @@
           <a:p>
             <a:pPr algn="ctr"/>
             <a:r>
-              <a:rPr lang="en-US" sz="900" dirty="0" smtClean="0"/>
+              <a:rPr lang="en-US" sz="900" dirty="0"/>
               <a:t>Deceased</a:t>
             </a:r>
-            <a:endParaRPr lang="en-US" sz="900" dirty="0"/>
           </a:p>
         </p:txBody>
       </p:sp>
@@ -10697,10 +10506,9 @@
             <a:p>
               <a:pPr algn="ctr"/>
               <a:r>
-                <a:rPr lang="en-US" sz="1000" dirty="0" smtClean="0"/>
+                <a:rPr lang="en-US" sz="1000" dirty="0"/>
                 <a:t>Org Home HC</a:t>
               </a:r>
-              <a:endParaRPr lang="en-US" sz="1000" dirty="0"/>
             </a:p>
           </p:txBody>
         </p:sp>
@@ -10741,10 +10549,9 @@
             <a:p>
               <a:pPr algn="ctr"/>
               <a:r>
-                <a:rPr lang="en-US" sz="1000" dirty="0" smtClean="0"/>
+                <a:rPr lang="en-US" sz="1000" dirty="0"/>
                 <a:t>Home</a:t>
               </a:r>
-              <a:endParaRPr lang="en-US" sz="1000" dirty="0"/>
             </a:p>
           </p:txBody>
         </p:sp>
@@ -10785,10 +10592,9 @@
             <a:p>
               <a:pPr algn="ctr"/>
               <a:r>
-                <a:rPr lang="en-US" sz="1000" dirty="0" smtClean="0"/>
+                <a:rPr lang="en-US" sz="1000" dirty="0"/>
                 <a:t>Hospice</a:t>
               </a:r>
-              <a:endParaRPr lang="en-US" sz="1000" dirty="0"/>
             </a:p>
           </p:txBody>
         </p:sp>
@@ -10829,10 +10635,9 @@
             <a:p>
               <a:pPr algn="ctr"/>
               <a:r>
-                <a:rPr lang="en-US" sz="1000" dirty="0" smtClean="0"/>
+                <a:rPr lang="en-US" sz="1000" dirty="0"/>
                 <a:t>Long Term</a:t>
               </a:r>
-              <a:endParaRPr lang="en-US" sz="1000" dirty="0"/>
             </a:p>
           </p:txBody>
         </p:sp>
@@ -10934,10 +10739,9 @@
           <a:p>
             <a:pPr algn="ctr"/>
             <a:r>
-              <a:rPr lang="en-US" sz="1000" dirty="0" smtClean="0"/>
+              <a:rPr lang="en-US" sz="1000" dirty="0"/>
               <a:t>SNF</a:t>
             </a:r>
-            <a:endParaRPr lang="en-US" sz="1000" dirty="0"/>
           </a:p>
         </p:txBody>
       </p:sp>
@@ -10978,10 +10782,9 @@
           <a:p>
             <a:pPr algn="ctr"/>
             <a:r>
-              <a:rPr lang="en-US" sz="1000" dirty="0" smtClean="0"/>
+              <a:rPr lang="en-US" sz="1000" dirty="0"/>
               <a:t>IRC</a:t>
             </a:r>
-            <a:endParaRPr lang="en-US" sz="1000" dirty="0"/>
           </a:p>
         </p:txBody>
       </p:sp>
@@ -11022,10 +10825,9 @@
           <a:p>
             <a:pPr algn="ctr"/>
             <a:r>
-              <a:rPr lang="en-US" sz="1000" dirty="0" smtClean="0"/>
+              <a:rPr lang="en-US" sz="1000" dirty="0"/>
               <a:t>ICF</a:t>
             </a:r>
-            <a:endParaRPr lang="en-US" sz="1000" dirty="0"/>
           </a:p>
         </p:txBody>
       </p:sp>
@@ -11110,17 +10912,16 @@
             <a:p>
               <a:pPr algn="ctr"/>
               <a:r>
-                <a:rPr lang="en-US" sz="1000" dirty="0" smtClean="0"/>
+                <a:rPr lang="en-US" sz="1000" dirty="0"/>
                 <a:t>Other</a:t>
               </a:r>
               <a:br>
-                <a:rPr lang="en-US" sz="1000" dirty="0" smtClean="0"/>
+                <a:rPr lang="en-US" sz="1000" dirty="0"/>
               </a:br>
               <a:r>
-                <a:rPr lang="en-US" sz="1000" dirty="0" smtClean="0"/>
+                <a:rPr lang="en-US" sz="1000" dirty="0"/>
                 <a:t>Hospital</a:t>
               </a:r>
-              <a:endParaRPr lang="en-US" sz="1000" dirty="0"/>
             </a:p>
           </p:txBody>
         </p:sp>
@@ -11191,10 +10992,9 @@
             <a:p>
               <a:pPr algn="ctr"/>
               <a:r>
-                <a:rPr lang="en-US" sz="1000" dirty="0" smtClean="0"/>
+                <a:rPr lang="en-US" sz="1000" dirty="0"/>
                 <a:t>SNF</a:t>
               </a:r>
-              <a:endParaRPr lang="en-US" sz="1000" dirty="0"/>
             </a:p>
           </p:txBody>
         </p:sp>
@@ -11235,10 +11035,9 @@
             <a:p>
               <a:pPr algn="ctr"/>
               <a:r>
-                <a:rPr lang="en-US" sz="1000" dirty="0" smtClean="0"/>
+                <a:rPr lang="en-US" sz="1000" dirty="0"/>
                 <a:t>IRC</a:t>
               </a:r>
-              <a:endParaRPr lang="en-US" sz="1000" dirty="0"/>
             </a:p>
           </p:txBody>
         </p:sp>
@@ -11279,10 +11078,9 @@
             <a:p>
               <a:pPr algn="ctr"/>
               <a:r>
-                <a:rPr lang="en-US" sz="1000" dirty="0" smtClean="0"/>
+                <a:rPr lang="en-US" sz="1000" dirty="0"/>
                 <a:t>ICF</a:t>
               </a:r>
-              <a:endParaRPr lang="en-US" sz="1000" dirty="0"/>
             </a:p>
           </p:txBody>
         </p:sp>
@@ -11363,10 +11161,9 @@
           <a:lstStyle/>
           <a:p>
             <a:r>
-              <a:rPr lang="en-US" dirty="0" smtClean="0"/>
+              <a:rPr lang="en-US" dirty="0"/>
               <a:t>Target</a:t>
             </a:r>
-            <a:endParaRPr lang="en-US" dirty="0"/>
           </a:p>
         </p:txBody>
       </p:sp>
@@ -11386,34 +11183,34 @@
           <a:lstStyle/>
           <a:p>
             <a:r>
-              <a:rPr lang="en-US" dirty="0" smtClean="0"/>
+              <a:rPr lang="en-US" dirty="0"/>
               <a:t>Classification Models: </a:t>
             </a:r>
           </a:p>
           <a:p>
             <a:pPr lvl="1"/>
             <a:r>
-              <a:rPr lang="en-US" dirty="0" smtClean="0"/>
+              <a:rPr lang="en-US" dirty="0"/>
               <a:t>30 day readmission Yes/No</a:t>
             </a:r>
           </a:p>
           <a:p>
             <a:r>
-              <a:rPr lang="en-US" dirty="0" smtClean="0"/>
+              <a:rPr lang="en-US" dirty="0"/>
               <a:t>Survival / Hazard Models:</a:t>
             </a:r>
           </a:p>
           <a:p>
             <a:pPr lvl="1"/>
             <a:r>
-              <a:rPr lang="en-US" dirty="0" smtClean="0"/>
+              <a:rPr lang="en-US" dirty="0"/>
               <a:t>Generate a predicted hazard rate by post discharge day.</a:t>
             </a:r>
           </a:p>
           <a:p>
             <a:pPr lvl="1"/>
             <a:r>
-              <a:rPr lang="en-US" dirty="0" smtClean="0"/>
+              <a:rPr lang="en-US" dirty="0"/>
               <a:t>Calculate cumulative remaining hazard</a:t>
             </a:r>
           </a:p>
@@ -11435,10 +11232,9 @@
           <a:lstStyle/>
           <a:p>
             <a:r>
-              <a:rPr lang="en-US" smtClean="0"/>
+              <a:rPr lang="en-US"/>
               <a:t>7/28/2015</a:t>
             </a:r>
-            <a:endParaRPr lang="en-US"/>
           </a:p>
         </p:txBody>
       </p:sp>
@@ -11458,10 +11254,9 @@
           <a:lstStyle/>
           <a:p>
             <a:r>
-              <a:rPr lang="en-US" smtClean="0"/>
+              <a:rPr lang="en-US"/>
               <a:t>UVA Medical System</a:t>
             </a:r>
-            <a:endParaRPr lang="en-US"/>
           </a:p>
         </p:txBody>
       </p:sp>
@@ -11713,7 +11508,7 @@
             <a:graphicData uri="http://schemas.openxmlformats.org/presentationml/2006/ole">
               <mc:AlternateContent xmlns:mc="http://schemas.openxmlformats.org/markup-compatibility/2006">
                 <mc:Choice xmlns:v="urn:schemas-microsoft-com:vml" Requires="v">
-                  <p:oleObj spid="_x0000_s1141" name="Equation" r:id="rId3" imgW="1130040" imgH="393480" progId="Equation.DSMT4">
+                  <p:oleObj spid="_x0000_s1144" name="Equation" r:id="rId3" imgW="1130040" imgH="393480" progId="Equation.DSMT4">
                     <p:embed/>
                   </p:oleObj>
                 </mc:Choice>
@@ -11783,7 +11578,7 @@
             <a:graphicData uri="http://schemas.openxmlformats.org/presentationml/2006/ole">
               <mc:AlternateContent xmlns:mc="http://schemas.openxmlformats.org/markup-compatibility/2006">
                 <mc:Choice xmlns:v="urn:schemas-microsoft-com:vml" Requires="v">
-                  <p:oleObj spid="_x0000_s1142" name="Equation" r:id="rId5" imgW="1218960" imgH="380880" progId="Equation.DSMT4">
+                  <p:oleObj spid="_x0000_s1145" name="Equation" r:id="rId5" imgW="1218960" imgH="380880" progId="Equation.DSMT4">
                     <p:embed/>
                   </p:oleObj>
                 </mc:Choice>
@@ -11854,10 +11649,9 @@
             <a:lstStyle/>
             <a:p>
               <a:r>
-                <a:rPr lang="en-US" dirty="0" smtClean="0"/>
+                <a:rPr lang="en-US" dirty="0"/>
                 <a:t>where</a:t>
               </a:r>
-              <a:endParaRPr lang="en-US" dirty="0"/>
             </a:p>
           </p:txBody>
         </p:sp>
@@ -11884,10 +11678,9 @@
             <a:lstStyle/>
             <a:p>
               <a:r>
-                <a:rPr lang="en-US" dirty="0" smtClean="0"/>
+                <a:rPr lang="en-US" dirty="0"/>
                 <a:t>and</a:t>
               </a:r>
-              <a:endParaRPr lang="en-US" dirty="0"/>
             </a:p>
           </p:txBody>
         </p:sp>
@@ -11913,7 +11706,7 @@
             <a:graphicData uri="http://schemas.openxmlformats.org/presentationml/2006/ole">
               <mc:AlternateContent xmlns:mc="http://schemas.openxmlformats.org/markup-compatibility/2006">
                 <mc:Choice xmlns:v="urn:schemas-microsoft-com:vml" Requires="v">
-                  <p:oleObj spid="_x0000_s1143" name="Equation" r:id="rId7" imgW="1257120" imgH="241200" progId="Equation.DSMT4">
+                  <p:oleObj spid="_x0000_s1146" name="Equation" r:id="rId7" imgW="1257120" imgH="241200" progId="Equation.DSMT4">
                     <p:embed/>
                   </p:oleObj>
                 </mc:Choice>
@@ -12008,10 +11801,9 @@
           <a:lstStyle/>
           <a:p>
             <a:r>
-              <a:rPr lang="en-US" dirty="0" smtClean="0"/>
+              <a:rPr lang="en-US" dirty="0"/>
               <a:t>Accuracy</a:t>
             </a:r>
-            <a:endParaRPr lang="en-US" dirty="0"/>
           </a:p>
         </p:txBody>
       </p:sp>
@@ -12031,10 +11823,9 @@
           <a:lstStyle/>
           <a:p>
             <a:r>
-              <a:rPr lang="en-US" smtClean="0"/>
+              <a:rPr lang="en-US"/>
               <a:t>7/28/2015</a:t>
             </a:r>
-            <a:endParaRPr lang="en-US"/>
           </a:p>
         </p:txBody>
       </p:sp>
@@ -12054,10 +11845,9 @@
           <a:lstStyle/>
           <a:p>
             <a:r>
-              <a:rPr lang="en-US" smtClean="0"/>
+              <a:rPr lang="en-US"/>
               <a:t>UVA Medical System</a:t>
             </a:r>
-            <a:endParaRPr lang="en-US"/>
           </a:p>
         </p:txBody>
       </p:sp>
@@ -12154,10 +11944,9 @@
           <a:lstStyle/>
           <a:p>
             <a:r>
-              <a:rPr lang="en-US" dirty="0" smtClean="0"/>
+              <a:rPr lang="en-US" dirty="0"/>
               <a:t>Process - Training</a:t>
             </a:r>
-            <a:endParaRPr lang="en-US" dirty="0"/>
           </a:p>
         </p:txBody>
       </p:sp>
@@ -12177,10 +11966,9 @@
           <a:lstStyle/>
           <a:p>
             <a:r>
-              <a:rPr lang="en-US" smtClean="0"/>
+              <a:rPr lang="en-US"/>
               <a:t>7/28/2015</a:t>
             </a:r>
-            <a:endParaRPr lang="en-US"/>
           </a:p>
         </p:txBody>
       </p:sp>
@@ -12200,10 +11988,9 @@
           <a:lstStyle/>
           <a:p>
             <a:r>
-              <a:rPr lang="en-US" smtClean="0"/>
+              <a:rPr lang="en-US"/>
               <a:t>UVA Medical System</a:t>
             </a:r>
-            <a:endParaRPr lang="en-US"/>
           </a:p>
         </p:txBody>
       </p:sp>
@@ -12273,18 +12060,13 @@
           <a:p>
             <a:pPr algn="ctr"/>
             <a:r>
-              <a:rPr lang="en-US" dirty="0" smtClean="0">
+              <a:rPr lang="en-US" dirty="0">
                 <a:solidFill>
                   <a:schemeClr val="tx1"/>
                 </a:solidFill>
               </a:rPr>
               <a:t>ETL</a:t>
             </a:r>
-            <a:endParaRPr lang="en-US" dirty="0">
-              <a:solidFill>
-                <a:schemeClr val="tx1"/>
-              </a:solidFill>
-            </a:endParaRPr>
           </a:p>
         </p:txBody>
       </p:sp>
@@ -12325,10 +12107,9 @@
           <a:p>
             <a:pPr algn="ctr"/>
             <a:r>
-              <a:rPr lang="en-US" dirty="0" smtClean="0"/>
+              <a:rPr lang="en-US" dirty="0"/>
               <a:t>ACO Data Files</a:t>
             </a:r>
-            <a:endParaRPr lang="en-US" dirty="0"/>
           </a:p>
         </p:txBody>
       </p:sp>
@@ -12369,10 +12150,9 @@
           <a:p>
             <a:pPr algn="ctr"/>
             <a:r>
-              <a:rPr lang="en-US" dirty="0" smtClean="0"/>
+              <a:rPr lang="en-US" dirty="0"/>
               <a:t>Patient History Database</a:t>
             </a:r>
-            <a:endParaRPr lang="en-US" dirty="0"/>
           </a:p>
         </p:txBody>
       </p:sp>
@@ -12416,17 +12196,16 @@
           <a:p>
             <a:pPr algn="ctr"/>
             <a:r>
-              <a:rPr lang="en-US" dirty="0" smtClean="0"/>
+              <a:rPr lang="en-US" dirty="0"/>
               <a:t>Diagnoses</a:t>
             </a:r>
             <a:br>
-              <a:rPr lang="en-US" dirty="0" smtClean="0"/>
+              <a:rPr lang="en-US" dirty="0"/>
             </a:br>
             <a:r>
-              <a:rPr lang="en-US" dirty="0" smtClean="0"/>
+              <a:rPr lang="en-US" dirty="0"/>
               <a:t>Procedures</a:t>
             </a:r>
-            <a:endParaRPr lang="en-US" dirty="0"/>
           </a:p>
         </p:txBody>
       </p:sp>
@@ -12623,7 +12402,7 @@
           <a:p>
             <a:pPr algn="ctr"/>
             <a:r>
-              <a:rPr lang="en-US" dirty="0" smtClean="0">
+              <a:rPr lang="en-US" dirty="0">
                 <a:ln w="0"/>
                 <a:solidFill>
                   <a:schemeClr val="tx1"/>
@@ -12638,19 +12417,6 @@
               </a:rPr>
               <a:t>Feature Extraction</a:t>
             </a:r>
-            <a:endParaRPr lang="en-US" dirty="0">
-              <a:ln w="0"/>
-              <a:solidFill>
-                <a:schemeClr val="tx1"/>
-              </a:solidFill>
-              <a:effectLst>
-                <a:outerShdw blurRad="38100" dist="19050" dir="2700000" algn="tl" rotWithShape="0">
-                  <a:schemeClr val="dk1">
-                    <a:alpha val="40000"/>
-                  </a:schemeClr>
-                </a:outerShdw>
-              </a:effectLst>
-            </a:endParaRPr>
           </a:p>
         </p:txBody>
       </p:sp>
@@ -12756,10 +12522,9 @@
           <a:p>
             <a:pPr algn="ctr"/>
             <a:r>
-              <a:rPr lang="en-US" dirty="0" smtClean="0"/>
+              <a:rPr lang="en-US" dirty="0"/>
               <a:t>Train / Test Data Set</a:t>
             </a:r>
-            <a:endParaRPr lang="en-US" dirty="0"/>
           </a:p>
         </p:txBody>
       </p:sp>
@@ -12868,7 +12633,7 @@
           <a:graphicData uri="http://schemas.openxmlformats.org/presentationml/2006/ole">
             <mc:AlternateContent xmlns:mc="http://schemas.openxmlformats.org/markup-compatibility/2006">
               <mc:Choice xmlns:v="urn:schemas-microsoft-com:vml" Requires="v">
-                <p:oleObj spid="_x0000_s3103" name="Equation" r:id="rId9" imgW="1384200" imgH="253800" progId="Equation.DSMT4">
+                <p:oleObj spid="_x0000_s3104" name="Equation" r:id="rId9" imgW="1384200" imgH="253800" progId="Equation.DSMT4">
                   <p:embed/>
                 </p:oleObj>
               </mc:Choice>
@@ -12991,10 +12756,9 @@
           <a:lstStyle/>
           <a:p>
             <a:r>
-              <a:rPr lang="en-US" dirty="0" smtClean="0"/>
+              <a:rPr lang="en-US" dirty="0"/>
               <a:t>Process - Scoring</a:t>
             </a:r>
-            <a:endParaRPr lang="en-US" dirty="0"/>
           </a:p>
         </p:txBody>
       </p:sp>
@@ -13014,10 +12778,9 @@
           <a:lstStyle/>
           <a:p>
             <a:r>
-              <a:rPr lang="en-US" dirty="0" smtClean="0"/>
+              <a:rPr lang="en-US" dirty="0"/>
               <a:t>7/28/2015</a:t>
             </a:r>
-            <a:endParaRPr lang="en-US" dirty="0"/>
           </a:p>
         </p:txBody>
       </p:sp>
@@ -13037,10 +12800,9 @@
           <a:lstStyle/>
           <a:p>
             <a:r>
-              <a:rPr lang="en-US" smtClean="0"/>
+              <a:rPr lang="en-US"/>
               <a:t>UVA Medical System</a:t>
             </a:r>
-            <a:endParaRPr lang="en-US"/>
           </a:p>
         </p:txBody>
       </p:sp>
@@ -13104,10 +12866,9 @@
           <a:p>
             <a:pPr algn="ctr"/>
             <a:r>
-              <a:rPr lang="en-US" dirty="0" smtClean="0"/>
+              <a:rPr lang="en-US" dirty="0"/>
               <a:t>Patient History Database</a:t>
             </a:r>
-            <a:endParaRPr lang="en-US" dirty="0"/>
           </a:p>
         </p:txBody>
       </p:sp>
@@ -13154,7 +12915,7 @@
           <a:p>
             <a:pPr algn="ctr"/>
             <a:r>
-              <a:rPr lang="en-US" dirty="0" smtClean="0">
+              <a:rPr lang="en-US" dirty="0">
                 <a:ln w="0"/>
                 <a:solidFill>
                   <a:schemeClr val="tx1"/>
@@ -13169,19 +12930,6 @@
               </a:rPr>
               <a:t>Feature Extraction</a:t>
             </a:r>
-            <a:endParaRPr lang="en-US" dirty="0">
-              <a:ln w="0"/>
-              <a:solidFill>
-                <a:schemeClr val="tx1"/>
-              </a:solidFill>
-              <a:effectLst>
-                <a:outerShdw blurRad="38100" dist="19050" dir="2700000" algn="tl" rotWithShape="0">
-                  <a:schemeClr val="dk1">
-                    <a:alpha val="40000"/>
-                  </a:schemeClr>
-                </a:outerShdw>
-              </a:effectLst>
-            </a:endParaRPr>
           </a:p>
         </p:txBody>
       </p:sp>
@@ -13229,7 +12977,7 @@
           <a:graphicData uri="http://schemas.openxmlformats.org/presentationml/2006/ole">
             <mc:AlternateContent xmlns:mc="http://schemas.openxmlformats.org/markup-compatibility/2006">
               <mc:Choice xmlns:v="urn:schemas-microsoft-com:vml" Requires="v">
-                <p:oleObj spid="_x0000_s4126" name="Equation" r:id="rId8" imgW="1384200" imgH="253800" progId="Equation.DSMT4">
+                <p:oleObj spid="_x0000_s4127" name="Equation" r:id="rId8" imgW="1384200" imgH="253800" progId="Equation.DSMT4">
                   <p:embed/>
                 </p:oleObj>
               </mc:Choice>
@@ -13374,10 +13122,9 @@
           <a:p>
             <a:pPr algn="ctr"/>
             <a:r>
-              <a:rPr lang="en-US" dirty="0" smtClean="0"/>
+              <a:rPr lang="en-US" dirty="0"/>
               <a:t>Daily Discharge Data Set</a:t>
             </a:r>
-            <a:endParaRPr lang="en-US" dirty="0"/>
           </a:p>
         </p:txBody>
       </p:sp>
@@ -13418,10 +13165,9 @@
           <a:p>
             <a:pPr algn="ctr"/>
             <a:r>
-              <a:rPr lang="en-US" dirty="0" smtClean="0"/>
+              <a:rPr lang="en-US" dirty="0"/>
               <a:t>Ranked List of Patients Discharged in Past 30 Days</a:t>
             </a:r>
-            <a:endParaRPr lang="en-US" dirty="0"/>
           </a:p>
         </p:txBody>
       </p:sp>
@@ -13570,10 +13316,9 @@
           <a:p>
             <a:pPr algn="ctr"/>
             <a:r>
-              <a:rPr lang="en-US" dirty="0" smtClean="0"/>
+              <a:rPr lang="en-US" dirty="0"/>
               <a:t>Scoring Data Set</a:t>
             </a:r>
-            <a:endParaRPr lang="en-US" dirty="0"/>
           </a:p>
         </p:txBody>
       </p:sp>
@@ -13764,10 +13509,9 @@
           <a:lstStyle/>
           <a:p>
             <a:r>
-              <a:rPr lang="en-US" dirty="0" smtClean="0"/>
+              <a:rPr lang="en-US" dirty="0"/>
               <a:t>Implementation Plan</a:t>
             </a:r>
-            <a:endParaRPr lang="en-US" dirty="0"/>
           </a:p>
         </p:txBody>
       </p:sp>
@@ -13789,82 +13533,82 @@
           <a:lstStyle/>
           <a:p>
             <a:r>
-              <a:rPr lang="en-US" dirty="0" smtClean="0"/>
+              <a:rPr lang="en-US" dirty="0"/>
               <a:t>Model Development &amp; Retrospective Testing Complete</a:t>
             </a:r>
           </a:p>
           <a:p>
             <a:r>
-              <a:rPr lang="en-US" dirty="0" smtClean="0"/>
+              <a:rPr lang="en-US" dirty="0"/>
               <a:t>“Silent” Prospective Testing</a:t>
             </a:r>
           </a:p>
           <a:p>
             <a:pPr lvl="1"/>
             <a:r>
-              <a:rPr lang="en-US" dirty="0" smtClean="0"/>
+              <a:rPr lang="en-US" dirty="0"/>
               <a:t>Train on most recent CMS Claims Data</a:t>
             </a:r>
           </a:p>
           <a:p>
             <a:pPr lvl="1"/>
             <a:r>
-              <a:rPr lang="en-US" dirty="0" smtClean="0"/>
+              <a:rPr lang="en-US" dirty="0"/>
               <a:t>Score discharged patients on a daily basis</a:t>
             </a:r>
           </a:p>
           <a:p>
             <a:pPr lvl="1"/>
             <a:r>
-              <a:rPr lang="en-US" dirty="0" smtClean="0"/>
+              <a:rPr lang="en-US" dirty="0"/>
               <a:t>Analyze predicted and actual results to measure true accuracy</a:t>
             </a:r>
           </a:p>
           <a:p>
             <a:r>
-              <a:rPr lang="en-US" dirty="0" smtClean="0"/>
+              <a:rPr lang="en-US" dirty="0"/>
               <a:t>Next Steps / Timing:</a:t>
             </a:r>
           </a:p>
           <a:p>
             <a:pPr lvl="1"/>
             <a:r>
-              <a:rPr lang="en-US" dirty="0" smtClean="0"/>
+              <a:rPr lang="en-US" dirty="0"/>
               <a:t>Epic backend integration: daily discharge data set</a:t>
             </a:r>
           </a:p>
           <a:p>
             <a:pPr lvl="2"/>
             <a:r>
-              <a:rPr lang="en-US" dirty="0" smtClean="0"/>
+              <a:rPr lang="en-US" dirty="0"/>
               <a:t>30 days after resource identified and assigned</a:t>
             </a:r>
           </a:p>
           <a:p>
             <a:pPr lvl="1"/>
             <a:r>
-              <a:rPr lang="en-US" dirty="0" smtClean="0"/>
+              <a:rPr lang="en-US" dirty="0"/>
               <a:t>Silent Test:</a:t>
             </a:r>
           </a:p>
           <a:p>
             <a:pPr lvl="2"/>
             <a:r>
-              <a:rPr lang="en-US" dirty="0" smtClean="0"/>
+              <a:rPr lang="en-US" dirty="0"/>
               <a:t>Does not require integration of scored output into Epic</a:t>
             </a:r>
           </a:p>
           <a:p>
             <a:pPr lvl="2"/>
             <a:r>
-              <a:rPr lang="en-US" dirty="0" smtClean="0"/>
+              <a:rPr lang="en-US" dirty="0"/>
               <a:t>120 days after Epic backend integration</a:t>
             </a:r>
           </a:p>
           <a:p>
             <a:pPr lvl="2"/>
             <a:r>
-              <a:rPr lang="en-US" dirty="0" smtClean="0"/>
+              <a:rPr lang="en-US" dirty="0"/>
               <a:t>Analyze results</a:t>
             </a:r>
           </a:p>
@@ -13879,30 +13623,25 @@
             <a:pPr lvl="2"/>
             <a:r>
               <a:rPr lang="en-US" dirty="0"/>
-              <a:t>?, Resource capable of Epic integration application </a:t>
-            </a:r>
-            <a:r>
-              <a:rPr lang="en-US" dirty="0" smtClean="0"/>
-              <a:t>development</a:t>
+              <a:t>?, Resource capable of Epic integration application development</a:t>
             </a:r>
           </a:p>
           <a:p>
             <a:pPr lvl="1"/>
             <a:r>
-              <a:rPr lang="en-US" dirty="0" smtClean="0"/>
+              <a:rPr lang="en-US" dirty="0"/>
               <a:t>Overall five to six months after project kickoff and resource assignment.</a:t>
             </a:r>
+          </a:p>
+          <a:p>
+            <a:pPr lvl="1"/>
             <a:endParaRPr lang="en-US" dirty="0"/>
-          </a:p>
-          <a:p>
-            <a:pPr lvl="1"/>
-            <a:endParaRPr lang="en-US" dirty="0" smtClean="0"/>
           </a:p>
           <a:p>
             <a:pPr marL="0" indent="0">
               <a:buNone/>
             </a:pPr>
-            <a:endParaRPr lang="en-US" dirty="0" smtClean="0"/>
+            <a:endParaRPr lang="en-US" dirty="0"/>
           </a:p>
         </p:txBody>
       </p:sp>
@@ -13922,10 +13661,9 @@
           <a:lstStyle/>
           <a:p>
             <a:r>
-              <a:rPr lang="en-US" smtClean="0"/>
+              <a:rPr lang="en-US"/>
               <a:t>7/28/2015</a:t>
             </a:r>
-            <a:endParaRPr lang="en-US"/>
           </a:p>
         </p:txBody>
       </p:sp>
@@ -13945,10 +13683,9 @@
           <a:lstStyle/>
           <a:p>
             <a:r>
-              <a:rPr lang="en-US" smtClean="0"/>
+              <a:rPr lang="en-US"/>
               <a:t>UVA Medical System</a:t>
             </a:r>
-            <a:endParaRPr lang="en-US"/>
           </a:p>
         </p:txBody>
       </p:sp>
@@ -14562,10 +14299,9 @@
           <a:lstStyle/>
           <a:p>
             <a:r>
-              <a:rPr lang="en-US" smtClean="0"/>
+              <a:rPr lang="en-US"/>
               <a:t>7/28/2015</a:t>
             </a:r>
-            <a:endParaRPr lang="en-US"/>
           </a:p>
         </p:txBody>
       </p:sp>
@@ -14590,10 +14326,9 @@
           <a:lstStyle/>
           <a:p>
             <a:r>
-              <a:rPr lang="en-US" smtClean="0"/>
+              <a:rPr lang="en-US"/>
               <a:t>UVA Medical System</a:t>
             </a:r>
-            <a:endParaRPr lang="en-US"/>
           </a:p>
         </p:txBody>
       </p:sp>
@@ -14653,7 +14388,7 @@
           <a:p>
             <a:pPr algn="ctr"/>
             <a:r>
-              <a:rPr lang="en-US" b="1" smtClean="0">
+              <a:rPr lang="en-US" b="1">
                 <a:solidFill>
                   <a:schemeClr val="accent2"/>
                 </a:solidFill>
@@ -14661,12 +14396,6 @@
               </a:rPr>
               <a:t>2015</a:t>
             </a:r>
-            <a:endParaRPr lang="en-US" b="1">
-              <a:solidFill>
-                <a:schemeClr val="accent2"/>
-              </a:solidFill>
-              <a:latin typeface="Calibri" panose="020F0502020204030204" pitchFamily="34" charset="0"/>
-            </a:endParaRPr>
           </a:p>
         </p:txBody>
       </p:sp>
@@ -14698,7 +14427,7 @@
           <a:p>
             <a:pPr algn="ctr"/>
             <a:r>
-              <a:rPr lang="en-US" b="1" spc="-38" smtClean="0">
+              <a:rPr lang="en-US" b="1" spc="-38">
                 <a:solidFill>
                   <a:schemeClr val="accent2"/>
                 </a:solidFill>
@@ -14706,12 +14435,6 @@
               </a:rPr>
               <a:t>2016</a:t>
             </a:r>
-            <a:endParaRPr lang="en-US" b="1" spc="-38">
-              <a:solidFill>
-                <a:schemeClr val="accent2"/>
-              </a:solidFill>
-              <a:latin typeface="Calibri" panose="020F0502020204030204" pitchFamily="34" charset="0"/>
-            </a:endParaRPr>
           </a:p>
         </p:txBody>
       </p:sp>
@@ -14981,7 +14704,7 @@
           <a:p>
             <a:pPr algn="ctr"/>
             <a:r>
-              <a:rPr lang="en-US" sz="1200" spc="-12" smtClean="0">
+              <a:rPr lang="en-US" sz="1200" spc="-12">
                 <a:solidFill>
                   <a:schemeClr val="dk1"/>
                 </a:solidFill>
@@ -14989,12 +14712,6 @@
               </a:rPr>
               <a:t>Today</a:t>
             </a:r>
-            <a:endParaRPr lang="en-US" sz="1200" spc="-12">
-              <a:solidFill>
-                <a:schemeClr val="dk1"/>
-              </a:solidFill>
-              <a:latin typeface="Calibri" panose="020F0502020204030204" pitchFamily="34" charset="0"/>
-            </a:endParaRPr>
           </a:p>
         </p:txBody>
       </p:sp>
@@ -15025,7 +14742,7 @@
           <a:lstStyle/>
           <a:p>
             <a:r>
-              <a:rPr lang="en-US" sz="1200" spc="-20" smtClean="0">
+              <a:rPr lang="en-US" sz="1200" spc="-20">
                 <a:solidFill>
                   <a:schemeClr val="dk1"/>
                 </a:solidFill>
@@ -15033,12 +14750,6 @@
               </a:rPr>
               <a:t>Aug</a:t>
             </a:r>
-            <a:endParaRPr lang="en-US" sz="1200" spc="-20">
-              <a:solidFill>
-                <a:schemeClr val="dk1"/>
-              </a:solidFill>
-              <a:latin typeface="Calibri" panose="020F0502020204030204" pitchFamily="34" charset="0"/>
-            </a:endParaRPr>
           </a:p>
         </p:txBody>
       </p:sp>
@@ -15069,7 +14780,7 @@
           <a:lstStyle/>
           <a:p>
             <a:r>
-              <a:rPr lang="en-US" sz="1200" spc="-18" smtClean="0">
+              <a:rPr lang="en-US" sz="1200" spc="-18">
                 <a:solidFill>
                   <a:schemeClr val="dk1"/>
                 </a:solidFill>
@@ -15077,12 +14788,6 @@
               </a:rPr>
               <a:t>Sep</a:t>
             </a:r>
-            <a:endParaRPr lang="en-US" sz="1200" spc="-18">
-              <a:solidFill>
-                <a:schemeClr val="dk1"/>
-              </a:solidFill>
-              <a:latin typeface="Calibri" panose="020F0502020204030204" pitchFamily="34" charset="0"/>
-            </a:endParaRPr>
           </a:p>
         </p:txBody>
       </p:sp>
@@ -15113,7 +14818,7 @@
           <a:lstStyle/>
           <a:p>
             <a:r>
-              <a:rPr lang="en-US" sz="1200" spc="-22" smtClean="0">
+              <a:rPr lang="en-US" sz="1200" spc="-22">
                 <a:solidFill>
                   <a:schemeClr val="dk1"/>
                 </a:solidFill>
@@ -15121,12 +14826,6 @@
               </a:rPr>
               <a:t>Oct</a:t>
             </a:r>
-            <a:endParaRPr lang="en-US" sz="1200" spc="-22">
-              <a:solidFill>
-                <a:schemeClr val="dk1"/>
-              </a:solidFill>
-              <a:latin typeface="Calibri" panose="020F0502020204030204" pitchFamily="34" charset="0"/>
-            </a:endParaRPr>
           </a:p>
         </p:txBody>
       </p:sp>
@@ -15157,7 +14856,7 @@
           <a:lstStyle/>
           <a:p>
             <a:r>
-              <a:rPr lang="en-US" sz="1200" spc="-20" smtClean="0">
+              <a:rPr lang="en-US" sz="1200" spc="-20">
                 <a:solidFill>
                   <a:schemeClr val="dk1"/>
                 </a:solidFill>
@@ -15165,12 +14864,6 @@
               </a:rPr>
               <a:t>Nov</a:t>
             </a:r>
-            <a:endParaRPr lang="en-US" sz="1200" spc="-20">
-              <a:solidFill>
-                <a:schemeClr val="dk1"/>
-              </a:solidFill>
-              <a:latin typeface="Calibri" panose="020F0502020204030204" pitchFamily="34" charset="0"/>
-            </a:endParaRPr>
           </a:p>
         </p:txBody>
       </p:sp>
@@ -15201,7 +14894,7 @@
           <a:lstStyle/>
           <a:p>
             <a:r>
-              <a:rPr lang="en-US" sz="1200" spc="-22" smtClean="0">
+              <a:rPr lang="en-US" sz="1200" spc="-22">
                 <a:solidFill>
                   <a:schemeClr val="dk1"/>
                 </a:solidFill>
@@ -15209,12 +14902,6 @@
               </a:rPr>
               <a:t>Dec</a:t>
             </a:r>
-            <a:endParaRPr lang="en-US" sz="1200" spc="-22">
-              <a:solidFill>
-                <a:schemeClr val="dk1"/>
-              </a:solidFill>
-              <a:latin typeface="Calibri" panose="020F0502020204030204" pitchFamily="34" charset="0"/>
-            </a:endParaRPr>
           </a:p>
         </p:txBody>
       </p:sp>
@@ -15245,7 +14932,7 @@
           <a:lstStyle/>
           <a:p>
             <a:r>
-              <a:rPr lang="en-US" sz="1200" spc="-20" smtClean="0">
+              <a:rPr lang="en-US" sz="1200" spc="-20">
                 <a:solidFill>
                   <a:schemeClr val="dk1"/>
                 </a:solidFill>
@@ -15253,12 +14940,6 @@
               </a:rPr>
               <a:t>2016</a:t>
             </a:r>
-            <a:endParaRPr lang="en-US" sz="1200" spc="-20">
-              <a:solidFill>
-                <a:schemeClr val="dk1"/>
-              </a:solidFill>
-              <a:latin typeface="Calibri" panose="020F0502020204030204" pitchFamily="34" charset="0"/>
-            </a:endParaRPr>
           </a:p>
         </p:txBody>
       </p:sp>
@@ -15289,7 +14970,7 @@
           <a:lstStyle/>
           <a:p>
             <a:r>
-              <a:rPr lang="en-US" sz="1100" b="1" spc="-10" smtClean="0">
+              <a:rPr lang="en-US" sz="1100" b="1" spc="-10">
                 <a:solidFill>
                   <a:schemeClr val="dk1"/>
                 </a:solidFill>
@@ -15297,12 +14978,6 @@
               </a:rPr>
               <a:t>Kick-off</a:t>
             </a:r>
-            <a:endParaRPr lang="en-US" sz="1100" b="1" spc="-10">
-              <a:solidFill>
-                <a:schemeClr val="dk1"/>
-              </a:solidFill>
-              <a:latin typeface="Calibri" panose="020F0502020204030204" pitchFamily="34" charset="0"/>
-            </a:endParaRPr>
           </a:p>
         </p:txBody>
       </p:sp>
@@ -15333,7 +15008,7 @@
           <a:lstStyle/>
           <a:p>
             <a:r>
-              <a:rPr lang="en-US" sz="1000" spc="-8" smtClean="0">
+              <a:rPr lang="en-US" sz="1000" spc="-8">
                 <a:solidFill>
                   <a:srgbClr val="1F497E"/>
                 </a:solidFill>
@@ -15341,12 +15016,6 @@
               </a:rPr>
               <a:t>8/10/2015</a:t>
             </a:r>
-            <a:endParaRPr lang="en-US" sz="1000" spc="-8">
-              <a:solidFill>
-                <a:srgbClr val="1F497E"/>
-              </a:solidFill>
-              <a:latin typeface="Calibri" panose="020F0502020204030204" pitchFamily="34" charset="0"/>
-            </a:endParaRPr>
           </a:p>
         </p:txBody>
       </p:sp>
@@ -15462,7 +15131,7 @@
           <a:lstStyle/>
           <a:p>
             <a:r>
-              <a:rPr lang="en-US" sz="1100" b="1" smtClean="0">
+              <a:rPr lang="en-US" sz="1100" b="1">
                 <a:solidFill>
                   <a:schemeClr val="dk1"/>
                 </a:solidFill>
@@ -15470,12 +15139,6 @@
               </a:rPr>
               <a:t>Identify &amp; assign Epic backend integration resources</a:t>
             </a:r>
-            <a:endParaRPr lang="en-US" sz="1100" b="1">
-              <a:solidFill>
-                <a:schemeClr val="dk1"/>
-              </a:solidFill>
-              <a:latin typeface="Calibri" panose="020F0502020204030204" pitchFamily="34" charset="0"/>
-            </a:endParaRPr>
           </a:p>
         </p:txBody>
       </p:sp>
@@ -15506,7 +15169,7 @@
           <a:lstStyle/>
           <a:p>
             <a:r>
-              <a:rPr lang="en-US" sz="1000" spc="-8" smtClean="0">
+              <a:rPr lang="en-US" sz="1000" spc="-8">
                 <a:solidFill>
                   <a:srgbClr val="1F497E"/>
                 </a:solidFill>
@@ -15514,12 +15177,6 @@
               </a:rPr>
               <a:t>8/17/2015</a:t>
             </a:r>
-            <a:endParaRPr lang="en-US" sz="1000" spc="-8">
-              <a:solidFill>
-                <a:srgbClr val="1F497E"/>
-              </a:solidFill>
-              <a:latin typeface="Calibri" panose="020F0502020204030204" pitchFamily="34" charset="0"/>
-            </a:endParaRPr>
           </a:p>
         </p:txBody>
       </p:sp>
@@ -15635,7 +15292,7 @@
           <a:lstStyle/>
           <a:p>
             <a:r>
-              <a:rPr lang="en-US" sz="1100" b="1" smtClean="0">
+              <a:rPr lang="en-US" sz="1100" b="1">
                 <a:solidFill>
                   <a:schemeClr val="dk1"/>
                 </a:solidFill>
@@ -15643,12 +15300,6 @@
               </a:rPr>
               <a:t>Complete Epic backend integration</a:t>
             </a:r>
-            <a:endParaRPr lang="en-US" sz="1100" b="1">
-              <a:solidFill>
-                <a:schemeClr val="dk1"/>
-              </a:solidFill>
-              <a:latin typeface="Calibri" panose="020F0502020204030204" pitchFamily="34" charset="0"/>
-            </a:endParaRPr>
           </a:p>
         </p:txBody>
       </p:sp>
@@ -15679,7 +15330,7 @@
           <a:lstStyle/>
           <a:p>
             <a:r>
-              <a:rPr lang="en-US" sz="1000" spc="-8" smtClean="0">
+              <a:rPr lang="en-US" sz="1000" spc="-8">
                 <a:solidFill>
                   <a:srgbClr val="1F497E"/>
                 </a:solidFill>
@@ -15687,12 +15338,6 @@
               </a:rPr>
               <a:t>9/21/2015</a:t>
             </a:r>
-            <a:endParaRPr lang="en-US" sz="1000" spc="-8">
-              <a:solidFill>
-                <a:srgbClr val="1F497E"/>
-              </a:solidFill>
-              <a:latin typeface="Calibri" panose="020F0502020204030204" pitchFamily="34" charset="0"/>
-            </a:endParaRPr>
           </a:p>
         </p:txBody>
       </p:sp>
@@ -15808,7 +15453,7 @@
           <a:lstStyle/>
           <a:p>
             <a:r>
-              <a:rPr lang="en-US" sz="1100" b="1" smtClean="0">
+              <a:rPr lang="en-US" sz="1100" b="1">
                 <a:solidFill>
                   <a:schemeClr val="dk1"/>
                 </a:solidFill>
@@ -15816,12 +15461,6 @@
               </a:rPr>
               <a:t>Initiate prospective scoring</a:t>
             </a:r>
-            <a:endParaRPr lang="en-US" sz="1100" b="1">
-              <a:solidFill>
-                <a:schemeClr val="dk1"/>
-              </a:solidFill>
-              <a:latin typeface="Calibri" panose="020F0502020204030204" pitchFamily="34" charset="0"/>
-            </a:endParaRPr>
           </a:p>
         </p:txBody>
       </p:sp>
@@ -15852,7 +15491,7 @@
           <a:lstStyle/>
           <a:p>
             <a:r>
-              <a:rPr lang="en-US" sz="1000" spc="-8" smtClean="0">
+              <a:rPr lang="en-US" sz="1000" spc="-8">
                 <a:solidFill>
                   <a:srgbClr val="1F497E"/>
                 </a:solidFill>
@@ -15860,12 +15499,6 @@
               </a:rPr>
               <a:t>9/28/2015</a:t>
             </a:r>
-            <a:endParaRPr lang="en-US" sz="1000" spc="-8">
-              <a:solidFill>
-                <a:srgbClr val="1F497E"/>
-              </a:solidFill>
-              <a:latin typeface="Calibri" panose="020F0502020204030204" pitchFamily="34" charset="0"/>
-            </a:endParaRPr>
           </a:p>
         </p:txBody>
       </p:sp>
@@ -15981,7 +15614,7 @@
           <a:lstStyle/>
           <a:p>
             <a:r>
-              <a:rPr lang="en-US" sz="1100" b="1" spc="-6" smtClean="0">
+              <a:rPr lang="en-US" sz="1100" b="1" spc="-6">
                 <a:solidFill>
                   <a:schemeClr val="dk1"/>
                 </a:solidFill>
@@ -15989,12 +15622,6 @@
               </a:rPr>
               <a:t>Analyze pilot results</a:t>
             </a:r>
-            <a:endParaRPr lang="en-US" sz="1100" b="1" spc="-6">
-              <a:solidFill>
-                <a:schemeClr val="dk1"/>
-              </a:solidFill>
-              <a:latin typeface="Calibri" panose="020F0502020204030204" pitchFamily="34" charset="0"/>
-            </a:endParaRPr>
           </a:p>
         </p:txBody>
       </p:sp>
@@ -16025,7 +15652,7 @@
           <a:lstStyle/>
           <a:p>
             <a:r>
-              <a:rPr lang="en-US" sz="1000" spc="-8" smtClean="0">
+              <a:rPr lang="en-US" sz="1000" spc="-8">
                 <a:solidFill>
                   <a:srgbClr val="1F497E"/>
                 </a:solidFill>
@@ -16033,12 +15660,6 @@
               </a:rPr>
               <a:t>1/4/2016</a:t>
             </a:r>
-            <a:endParaRPr lang="en-US" sz="1000" spc="-8">
-              <a:solidFill>
-                <a:srgbClr val="1F497E"/>
-              </a:solidFill>
-              <a:latin typeface="Calibri" panose="020F0502020204030204" pitchFamily="34" charset="0"/>
-            </a:endParaRPr>
           </a:p>
         </p:txBody>
       </p:sp>
@@ -16154,7 +15775,7 @@
           <a:lstStyle/>
           <a:p>
             <a:r>
-              <a:rPr lang="en-US" sz="1100" b="1" spc="-6" smtClean="0">
+              <a:rPr lang="en-US" sz="1100" b="1" spc="-6">
                 <a:solidFill>
                   <a:schemeClr val="dk1"/>
                 </a:solidFill>
@@ -16162,12 +15783,6 @@
               </a:rPr>
               <a:t>Present pilot results</a:t>
             </a:r>
-            <a:endParaRPr lang="en-US" sz="1100" b="1" spc="-6">
-              <a:solidFill>
-                <a:schemeClr val="dk1"/>
-              </a:solidFill>
-              <a:latin typeface="Calibri" panose="020F0502020204030204" pitchFamily="34" charset="0"/>
-            </a:endParaRPr>
           </a:p>
         </p:txBody>
       </p:sp>
@@ -16198,7 +15813,7 @@
           <a:lstStyle/>
           <a:p>
             <a:r>
-              <a:rPr lang="en-US" sz="1000" spc="-8" smtClean="0">
+              <a:rPr lang="en-US" sz="1000" spc="-8">
                 <a:solidFill>
                   <a:srgbClr val="1F497E"/>
                 </a:solidFill>
@@ -16206,12 +15821,6 @@
               </a:rPr>
               <a:t>1/11/2016</a:t>
             </a:r>
-            <a:endParaRPr lang="en-US" sz="1000" spc="-8">
-              <a:solidFill>
-                <a:srgbClr val="1F497E"/>
-              </a:solidFill>
-              <a:latin typeface="Calibri" panose="020F0502020204030204" pitchFamily="34" charset="0"/>
-            </a:endParaRPr>
           </a:p>
         </p:txBody>
       </p:sp>
@@ -16327,7 +15936,7 @@
           <a:lstStyle/>
           <a:p>
             <a:r>
-              <a:rPr lang="en-US" sz="1100" b="1" smtClean="0">
+              <a:rPr lang="en-US" sz="1100" b="1">
                 <a:solidFill>
                   <a:schemeClr val="dk1"/>
                 </a:solidFill>
@@ -16335,12 +15944,6 @@
               </a:rPr>
               <a:t>Identify and assign Epic frontend application developer</a:t>
             </a:r>
-            <a:endParaRPr lang="en-US" sz="1100" b="1">
-              <a:solidFill>
-                <a:schemeClr val="dk1"/>
-              </a:solidFill>
-              <a:latin typeface="Calibri" panose="020F0502020204030204" pitchFamily="34" charset="0"/>
-            </a:endParaRPr>
           </a:p>
         </p:txBody>
       </p:sp>
@@ -16371,7 +15974,7 @@
           <a:lstStyle/>
           <a:p>
             <a:r>
-              <a:rPr lang="en-US" sz="1000" spc="-8" smtClean="0">
+              <a:rPr lang="en-US" sz="1000" spc="-8">
                 <a:solidFill>
                   <a:srgbClr val="1F497E"/>
                 </a:solidFill>
@@ -16379,12 +15982,6 @@
               </a:rPr>
               <a:t>10/1/2015</a:t>
             </a:r>
-            <a:endParaRPr lang="en-US" sz="1000" spc="-8">
-              <a:solidFill>
-                <a:srgbClr val="1F497E"/>
-              </a:solidFill>
-              <a:latin typeface="Calibri" panose="020F0502020204030204" pitchFamily="34" charset="0"/>
-            </a:endParaRPr>
           </a:p>
         </p:txBody>
       </p:sp>
@@ -16500,7 +16097,7 @@
           <a:lstStyle/>
           <a:p>
             <a:r>
-              <a:rPr lang="en-US" sz="1100" b="1" smtClean="0">
+              <a:rPr lang="en-US" sz="1100" b="1">
                 <a:solidFill>
                   <a:schemeClr val="dk1"/>
                 </a:solidFill>
@@ -16508,12 +16105,6 @@
               </a:rPr>
               <a:t>Complete Epic frontend application development</a:t>
             </a:r>
-            <a:endParaRPr lang="en-US" sz="1100" b="1">
-              <a:solidFill>
-                <a:schemeClr val="dk1"/>
-              </a:solidFill>
-              <a:latin typeface="Calibri" panose="020F0502020204030204" pitchFamily="34" charset="0"/>
-            </a:endParaRPr>
           </a:p>
         </p:txBody>
       </p:sp>
@@ -16544,7 +16135,7 @@
           <a:lstStyle/>
           <a:p>
             <a:r>
-              <a:rPr lang="en-US" sz="1000" spc="-8" smtClean="0">
+              <a:rPr lang="en-US" sz="1000" spc="-8">
                 <a:solidFill>
                   <a:srgbClr val="1F497E"/>
                 </a:solidFill>
@@ -16552,12 +16143,6 @@
               </a:rPr>
               <a:t>1/18/2016</a:t>
             </a:r>
-            <a:endParaRPr lang="en-US" sz="1000" spc="-8">
-              <a:solidFill>
-                <a:srgbClr val="1F497E"/>
-              </a:solidFill>
-              <a:latin typeface="Calibri" panose="020F0502020204030204" pitchFamily="34" charset="0"/>
-            </a:endParaRPr>
           </a:p>
         </p:txBody>
       </p:sp>
@@ -16695,10 +16280,9 @@
           <a:lstStyle/>
           <a:p>
             <a:r>
-              <a:rPr lang="en-US" dirty="0" smtClean="0"/>
+              <a:rPr lang="en-US" dirty="0"/>
               <a:t>Executive Summary</a:t>
             </a:r>
-            <a:endParaRPr lang="en-US" dirty="0"/>
           </a:p>
         </p:txBody>
       </p:sp>
@@ -16725,21 +16309,13 @@
             </a:r>
             <a:r>
               <a:rPr lang="en-US" dirty="0"/>
-              <a:t>. To develop </a:t>
-            </a:r>
-            <a:r>
-              <a:rPr lang="en-US" dirty="0" smtClean="0"/>
-              <a:t>a software application to assist ACO Care Coordinators in prioritizing intervention efforts allocated to ACO patients discharged within the previous 30 days.</a:t>
-            </a:r>
-          </a:p>
-          <a:p>
-            <a:r>
-              <a:rPr lang="en-US" b="1" dirty="0" smtClean="0"/>
-              <a:t>Data </a:t>
-            </a:r>
+              <a:t>. To develop a software application to assist ACO Care Coordinators in prioritizing intervention efforts allocated to ACO patients discharged within the previous 30 days.</a:t>
+            </a:r>
+          </a:p>
+          <a:p>
             <a:r>
               <a:rPr lang="en-US" b="1" dirty="0"/>
-              <a:t>Sources. </a:t>
+              <a:t>Data Sources. </a:t>
             </a:r>
             <a:r>
               <a:rPr lang="en-US" dirty="0"/>
@@ -16748,42 +16324,26 @@
           </a:p>
           <a:p>
             <a:r>
-              <a:rPr lang="en-US" b="1" dirty="0" smtClean="0"/>
+              <a:rPr lang="en-US" b="1" dirty="0"/>
               <a:t>Technology. </a:t>
             </a:r>
             <a:r>
-              <a:rPr lang="en-US" dirty="0" smtClean="0"/>
+              <a:rPr lang="en-US" dirty="0"/>
               <a:t>A predictive model based on statistical learning techniques</a:t>
             </a:r>
             <a:r>
-              <a:rPr lang="en-US" b="1" dirty="0" smtClean="0"/>
+              <a:rPr lang="en-US" b="1" dirty="0"/>
               <a:t> </a:t>
             </a:r>
             <a:r>
-              <a:rPr lang="en-US" dirty="0" smtClean="0"/>
-              <a:t>used </a:t>
-            </a:r>
-            <a:r>
               <a:rPr lang="en-US" dirty="0"/>
-              <a:t>to predict </a:t>
-            </a:r>
-            <a:r>
-              <a:rPr lang="en-US" dirty="0" smtClean="0"/>
-              <a:t>a </a:t>
-            </a:r>
-            <a:r>
-              <a:rPr lang="en-US" dirty="0"/>
-              <a:t>patient’s hazard function across the first 30 days post discharge.</a:t>
-            </a:r>
-          </a:p>
-          <a:p>
-            <a:r>
-              <a:rPr lang="en-US" b="1" dirty="0" smtClean="0"/>
-              <a:t>Performance</a:t>
-            </a:r>
+              <a:t>used to predict a patient’s hazard function across the first 30 days post discharge.</a:t>
+            </a:r>
+          </a:p>
+          <a:p>
             <a:r>
               <a:rPr lang="en-US" b="1" dirty="0"/>
-              <a:t>. </a:t>
+              <a:t>Performance. </a:t>
             </a:r>
             <a:r>
               <a:rPr lang="en-US" dirty="0"/>
@@ -16811,10 +16371,9 @@
           <a:lstStyle/>
           <a:p>
             <a:r>
-              <a:rPr lang="en-US" smtClean="0"/>
+              <a:rPr lang="en-US"/>
               <a:t>7/28/2015</a:t>
             </a:r>
-            <a:endParaRPr lang="en-US"/>
           </a:p>
         </p:txBody>
       </p:sp>
@@ -16834,10 +16393,9 @@
           <a:lstStyle/>
           <a:p>
             <a:r>
-              <a:rPr lang="en-US" smtClean="0"/>
+              <a:rPr lang="en-US"/>
               <a:t>UVA Medical System</a:t>
             </a:r>
-            <a:endParaRPr lang="en-US"/>
           </a:p>
         </p:txBody>
       </p:sp>
@@ -16910,10 +16468,9 @@
           <a:lstStyle/>
           <a:p>
             <a:r>
-              <a:rPr lang="en-US" dirty="0" smtClean="0"/>
+              <a:rPr lang="en-US" dirty="0"/>
               <a:t>30 Day All Cause Readmission</a:t>
             </a:r>
-            <a:endParaRPr lang="en-US" dirty="0"/>
           </a:p>
         </p:txBody>
       </p:sp>
@@ -16933,10 +16490,9 @@
           <a:lstStyle/>
           <a:p>
             <a:r>
-              <a:rPr lang="en-US" smtClean="0"/>
+              <a:rPr lang="en-US"/>
               <a:t>7/28/2015</a:t>
             </a:r>
-            <a:endParaRPr lang="en-US"/>
           </a:p>
         </p:txBody>
       </p:sp>
@@ -16956,10 +16512,9 @@
           <a:lstStyle/>
           <a:p>
             <a:r>
-              <a:rPr lang="en-US" smtClean="0"/>
+              <a:rPr lang="en-US"/>
               <a:t>UVA Medical System</a:t>
             </a:r>
-            <a:endParaRPr lang="en-US"/>
           </a:p>
         </p:txBody>
       </p:sp>
@@ -17086,10 +16641,9 @@
           <a:lstStyle/>
           <a:p>
             <a:r>
-              <a:rPr lang="en-US" dirty="0" smtClean="0"/>
+              <a:rPr lang="en-US" dirty="0"/>
               <a:t>Use Case</a:t>
             </a:r>
-            <a:endParaRPr lang="en-US" dirty="0"/>
           </a:p>
         </p:txBody>
       </p:sp>
@@ -17116,56 +16670,56 @@
           <a:lstStyle/>
           <a:p>
             <a:r>
-              <a:rPr lang="en-US" dirty="0" smtClean="0"/>
+              <a:rPr lang="en-US" dirty="0"/>
               <a:t>Large Case Load: </a:t>
             </a:r>
           </a:p>
           <a:p>
             <a:pPr lvl="1"/>
             <a:r>
-              <a:rPr lang="en-US" dirty="0" smtClean="0"/>
+              <a:rPr lang="en-US" dirty="0"/>
               <a:t>Between January 2013 and April 2015, the number of ACO patients discharged within the previous 30 days averaged 386; of whom 47 would experience an unplanned readmission, related to their initial hospitalization, within 30 days of their discharge.</a:t>
             </a:r>
           </a:p>
           <a:p>
             <a:pPr lvl="1"/>
-            <a:endParaRPr lang="en-US" dirty="0" smtClean="0"/>
-          </a:p>
-          <a:p>
-            <a:r>
-              <a:rPr lang="en-US" dirty="0" smtClean="0"/>
+            <a:endParaRPr lang="en-US" dirty="0"/>
+          </a:p>
+          <a:p>
+            <a:r>
+              <a:rPr lang="en-US" dirty="0"/>
               <a:t>Application:</a:t>
             </a:r>
           </a:p>
           <a:p>
             <a:pPr lvl="1"/>
             <a:r>
-              <a:rPr lang="en-US" dirty="0" smtClean="0"/>
+              <a:rPr lang="en-US" dirty="0"/>
               <a:t>Provide a list of ACO patients discharged over the previous 30 days in ranked relative order of likelihood of being readmitted less than 30 days post discharge.</a:t>
             </a:r>
           </a:p>
           <a:p>
             <a:pPr lvl="2"/>
             <a:r>
-              <a:rPr lang="en-US" dirty="0" smtClean="0"/>
+              <a:rPr lang="en-US" dirty="0"/>
               <a:t>Post discharge follow-up intervention reduced utilization by 8.3% </a:t>
             </a:r>
             <a:r>
-              <a:rPr lang="en-US" baseline="30000" dirty="0" smtClean="0"/>
+              <a:rPr lang="en-US" baseline="30000" dirty="0"/>
               <a:t>1</a:t>
             </a:r>
           </a:p>
           <a:p>
             <a:pPr lvl="3"/>
             <a:r>
-              <a:rPr lang="en-US" dirty="0" smtClean="0"/>
+              <a:rPr lang="en-US" dirty="0"/>
               <a:t>42 minutes per patient</a:t>
             </a:r>
           </a:p>
           <a:p>
             <a:pPr lvl="2"/>
             <a:r>
-              <a:rPr lang="en-US" dirty="0" smtClean="0"/>
+              <a:rPr lang="en-US" dirty="0"/>
               <a:t>For UVA case load, 9 hrs./ day for follow-up efforts.</a:t>
             </a:r>
           </a:p>
@@ -17178,16 +16732,12 @@
               <a:buNone/>
             </a:pPr>
             <a:r>
-              <a:rPr lang="en-US" sz="1700" baseline="30000" dirty="0" smtClean="0"/>
+              <a:rPr lang="en-US" sz="1700" baseline="30000" dirty="0"/>
               <a:t>1</a:t>
             </a:r>
             <a:r>
-              <a:rPr lang="en-US" sz="1700" dirty="0" smtClean="0"/>
-              <a:t> Jack</a:t>
-            </a:r>
-            <a:r>
               <a:rPr lang="en-US" sz="1700" dirty="0"/>
-              <a:t>, B. W. </a:t>
+              <a:t> Jack, B. W. </a:t>
             </a:r>
             <a:r>
               <a:rPr lang="en-US" sz="1700" i="1" dirty="0"/>
@@ -17221,24 +16771,12 @@
               <a:rPr lang="en-US" sz="1700" dirty="0"/>
               <a:t> </a:t>
             </a:r>
-            <a:r>
-              <a:rPr lang="en-US" sz="1700" dirty="0" smtClean="0"/>
-              <a:t/>
-            </a:r>
             <a:br>
-              <a:rPr lang="en-US" sz="1700" dirty="0" smtClean="0"/>
+              <a:rPr lang="en-US" sz="1700" dirty="0"/>
             </a:br>
             <a:r>
-              <a:rPr lang="en-US" sz="1700" dirty="0" smtClean="0"/>
-              <a:t>   178–187 </a:t>
-            </a:r>
-            <a:r>
               <a:rPr lang="en-US" sz="1700" dirty="0"/>
-              <a:t>(2009</a:t>
-            </a:r>
-            <a:r>
-              <a:rPr lang="en-US" sz="1700" dirty="0" smtClean="0"/>
-              <a:t>).</a:t>
+              <a:t>   178–187 (2009).</a:t>
             </a:r>
             <a:endParaRPr lang="en-US" dirty="0"/>
           </a:p>
@@ -17260,10 +16798,9 @@
           <a:lstStyle/>
           <a:p>
             <a:r>
-              <a:rPr lang="en-US" dirty="0" smtClean="0"/>
+              <a:rPr lang="en-US" dirty="0"/>
               <a:t>7/28/2015</a:t>
             </a:r>
-            <a:endParaRPr lang="en-US" dirty="0"/>
           </a:p>
         </p:txBody>
       </p:sp>
@@ -17283,10 +16820,9 @@
           <a:lstStyle/>
           <a:p>
             <a:r>
-              <a:rPr lang="en-US" smtClean="0"/>
+              <a:rPr lang="en-US"/>
               <a:t>UVA Medical System</a:t>
             </a:r>
-            <a:endParaRPr lang="en-US"/>
           </a:p>
         </p:txBody>
       </p:sp>
@@ -17359,10 +16895,9 @@
           <a:lstStyle/>
           <a:p>
             <a:r>
-              <a:rPr lang="en-US" dirty="0" smtClean="0"/>
+              <a:rPr lang="en-US" dirty="0"/>
               <a:t>Potential Savings</a:t>
             </a:r>
-            <a:endParaRPr lang="en-US" dirty="0"/>
           </a:p>
         </p:txBody>
       </p:sp>
@@ -17382,20 +16917,20 @@
           <a:lstStyle/>
           <a:p>
             <a:r>
-              <a:rPr lang="en-US" dirty="0" smtClean="0"/>
+              <a:rPr lang="en-US" dirty="0"/>
               <a:t>Profit vs. penalty:</a:t>
             </a:r>
           </a:p>
           <a:p>
             <a:pPr lvl="1"/>
             <a:r>
-              <a:rPr lang="en-US" dirty="0" smtClean="0"/>
+              <a:rPr lang="en-US" dirty="0"/>
               <a:t>In 2013, estimated profits on “excess” readmissions was $95M, penalties during the same period were estimated at $280M.</a:t>
             </a:r>
           </a:p>
           <a:p>
             <a:r>
-              <a:rPr lang="en-US" dirty="0" smtClean="0"/>
+              <a:rPr lang="en-US" dirty="0"/>
               <a:t>Opportunity cost</a:t>
             </a:r>
           </a:p>
@@ -17417,10 +16952,9 @@
           <a:lstStyle/>
           <a:p>
             <a:r>
-              <a:rPr lang="en-US" smtClean="0"/>
+              <a:rPr lang="en-US"/>
               <a:t>7/28/2015</a:t>
             </a:r>
-            <a:endParaRPr lang="en-US"/>
           </a:p>
         </p:txBody>
       </p:sp>
@@ -17440,10 +16974,9 @@
           <a:lstStyle/>
           <a:p>
             <a:r>
-              <a:rPr lang="en-US" smtClean="0"/>
+              <a:rPr lang="en-US"/>
               <a:t>UVA Medical System</a:t>
             </a:r>
-            <a:endParaRPr lang="en-US"/>
           </a:p>
         </p:txBody>
       </p:sp>
@@ -17516,10 +17049,9 @@
           <a:lstStyle/>
           <a:p>
             <a:r>
-              <a:rPr lang="en-US" dirty="0" smtClean="0"/>
+              <a:rPr lang="en-US" dirty="0"/>
               <a:t>State of the Art</a:t>
             </a:r>
-            <a:endParaRPr lang="en-US" dirty="0"/>
           </a:p>
         </p:txBody>
       </p:sp>
@@ -17546,105 +17078,57 @@
           <a:lstStyle/>
           <a:p>
             <a:r>
-              <a:rPr lang="en-US" b="1" dirty="0" smtClean="0"/>
+              <a:rPr lang="en-US" b="1" dirty="0"/>
               <a:t>Domain: </a:t>
             </a:r>
           </a:p>
           <a:p>
             <a:pPr lvl="1"/>
             <a:r>
-              <a:rPr lang="en-US" dirty="0" smtClean="0"/>
+              <a:rPr lang="en-US" dirty="0"/>
               <a:t>Models to predict 30 day readmission in the US, using retrospective administration data such as CMS Claims Data Feed</a:t>
             </a:r>
           </a:p>
           <a:p>
             <a:r>
-              <a:rPr lang="en-US" b="1" dirty="0" smtClean="0"/>
+              <a:rPr lang="en-US" b="1" dirty="0"/>
               <a:t>Results</a:t>
             </a:r>
             <a:r>
-              <a:rPr lang="en-US" dirty="0" smtClean="0"/>
+              <a:rPr lang="en-US" dirty="0"/>
               <a:t>:</a:t>
             </a:r>
           </a:p>
           <a:p>
             <a:pPr lvl="1"/>
             <a:r>
-              <a:rPr lang="en-US" dirty="0" smtClean="0"/>
-              <a:t>Nine </a:t>
-            </a:r>
-            <a:r>
               <a:rPr lang="en-US" dirty="0"/>
-              <a:t>large population-based or multicenter US studies </a:t>
-            </a:r>
-            <a:r>
-              <a:rPr lang="en-US" dirty="0" smtClean="0"/>
-              <a:t>had c-statistics </a:t>
-            </a:r>
+              <a:t>Nine large population-based or multicenter US studies had c-statistics 0.55 – 0.65</a:t>
+            </a:r>
+            <a:r>
+              <a:rPr lang="en-US" baseline="30000" dirty="0"/>
+              <a:t>1</a:t>
+            </a:r>
+          </a:p>
+          <a:p>
+            <a:pPr lvl="1"/>
             <a:r>
               <a:rPr lang="en-US" dirty="0"/>
-              <a:t>0.55 – </a:t>
-            </a:r>
-            <a:r>
-              <a:rPr lang="en-US" dirty="0" smtClean="0"/>
-              <a:t>0.65</a:t>
-            </a:r>
-            <a:r>
-              <a:rPr lang="en-US" baseline="30000" dirty="0" smtClean="0"/>
-              <a:t>1</a:t>
+              <a:t>Models developed by CMS for congestive heart failure, acute myocardial infarction, and pneumonia had c-statistics of 0.61, 0.63, and 0.63, respectively</a:t>
             </a:r>
           </a:p>
           <a:p>
             <a:pPr lvl="1"/>
             <a:r>
-              <a:rPr lang="en-US" dirty="0" smtClean="0"/>
-              <a:t>Models developed by CMS </a:t>
-            </a:r>
-            <a:r>
               <a:rPr lang="en-US" dirty="0"/>
-              <a:t>for congestive heart failure, acute myocardial infarction, and pneumonia </a:t>
-            </a:r>
-            <a:r>
-              <a:rPr lang="en-US" dirty="0" smtClean="0"/>
-              <a:t>had c-statistics of 0.61</a:t>
+              <a:t>Human expert based protocols fared even worse with AUC statistics from 0.50 for case managers to 0.59 for interns, 0.56 for Physicians </a:t>
+            </a:r>
+            <a:r>
+              <a:rPr lang="en-US" baseline="30000" dirty="0"/>
+              <a:t>2</a:t>
             </a:r>
             <a:r>
               <a:rPr lang="en-US" dirty="0"/>
-              <a:t>, 0.63, and 0.63, </a:t>
-            </a:r>
-            <a:r>
-              <a:rPr lang="en-US" dirty="0" smtClean="0"/>
-              <a:t>respectively</a:t>
-            </a:r>
-          </a:p>
-          <a:p>
-            <a:pPr lvl="1"/>
-            <a:r>
-              <a:rPr lang="en-US" dirty="0" smtClean="0"/>
-              <a:t>Human expert based protocols fared even worse with AUC statistics from </a:t>
-            </a:r>
-            <a:r>
-              <a:rPr lang="en-US" dirty="0"/>
-              <a:t>0.50 for case </a:t>
-            </a:r>
-            <a:r>
-              <a:rPr lang="en-US" dirty="0" smtClean="0"/>
-              <a:t>managers to </a:t>
-            </a:r>
-            <a:r>
-              <a:rPr lang="en-US" dirty="0"/>
-              <a:t>0.59 for interns, 0.56 for </a:t>
-            </a:r>
-            <a:r>
-              <a:rPr lang="en-US" dirty="0" smtClean="0"/>
-              <a:t>Physicians </a:t>
-            </a:r>
-            <a:r>
-              <a:rPr lang="en-US" baseline="30000" dirty="0" smtClean="0"/>
-              <a:t>2</a:t>
-            </a:r>
-            <a:r>
-              <a:rPr lang="en-US" dirty="0" smtClean="0"/>
               <a:t>.  </a:t>
             </a:r>
           </a:p>
@@ -17653,147 +17137,31 @@
               <a:buNone/>
             </a:pPr>
             <a:r>
-              <a:rPr lang="en-US" sz="1700" baseline="30000" dirty="0" smtClean="0"/>
+              <a:rPr lang="en-US" sz="1700" baseline="30000" dirty="0"/>
               <a:t>1 </a:t>
             </a:r>
             <a:r>
-              <a:rPr lang="en-US" sz="1700" dirty="0" err="1" smtClean="0"/>
+              <a:rPr lang="en-US" sz="1700" dirty="0" err="1"/>
               <a:t>Kansagara</a:t>
             </a:r>
             <a:r>
               <a:rPr lang="en-US" sz="1700" dirty="0"/>
-              <a:t>, D. et al. Risk Prediction Models for Hospital Readmission: A Systematic Review. (Department of Veterans </a:t>
-            </a:r>
-            <a:r>
-              <a:rPr lang="en-US" sz="1700" dirty="0" smtClean="0"/>
-              <a:t>  </a:t>
+              <a:t>, D. et al. Risk Prediction Models for Hospital Readmission: A Systematic Review. (Department of Veterans   </a:t>
             </a:r>
             <a:br>
-              <a:rPr lang="en-US" sz="1700" dirty="0" smtClean="0"/>
+              <a:rPr lang="en-US" sz="1700" dirty="0"/>
             </a:br>
             <a:r>
-              <a:rPr lang="en-US" sz="1700" dirty="0" smtClean="0"/>
-              <a:t>  Affairs </a:t>
-            </a:r>
-            <a:r>
               <a:rPr lang="en-US" sz="1700" dirty="0"/>
-              <a:t>(US), 2011). at </a:t>
-            </a:r>
-            <a:r>
-              <a:rPr lang="en-US" sz="1700" dirty="0" smtClean="0">
-                <a:hlinkClick r:id="rId2"/>
-              </a:rPr>
-              <a:t>http</a:t>
+              <a:t>  Affairs (US), 2011). at </a:t>
             </a:r>
             <a:r>
               <a:rPr lang="en-US" sz="1700" dirty="0">
                 <a:hlinkClick r:id="rId2"/>
               </a:rPr>
-              <a:t>://www.ncbi.nlm.nih.gov/books/NBK82578</a:t>
-            </a:r>
-            <a:r>
-              <a:rPr lang="en-US" sz="1700" dirty="0" smtClean="0">
-                <a:hlinkClick r:id="rId2"/>
-              </a:rPr>
-              <a:t>/</a:t>
+              <a:t>http://www.ncbi.nlm.nih.gov/books/NBK82578/</a:t>
             </a:r>
             <a:endParaRPr lang="en-US" sz="1700" dirty="0"/>
-          </a:p>
-          <a:p>
-            <a:pPr marL="0" indent="0">
-              <a:buNone/>
-            </a:pPr>
-            <a:endParaRPr lang="en-US" sz="1700" dirty="0" smtClean="0"/>
-          </a:p>
-          <a:p>
-            <a:pPr marL="0" indent="0">
-              <a:buNone/>
-            </a:pPr>
-            <a:r>
-              <a:rPr lang="en-US" sz="1600" baseline="30000" dirty="0" smtClean="0"/>
-              <a:t>2</a:t>
-            </a:r>
-            <a:r>
-              <a:rPr lang="en-US" sz="1600" dirty="0" smtClean="0"/>
-              <a:t> </a:t>
-            </a:r>
-            <a:r>
-              <a:rPr lang="en-US" sz="1600" dirty="0" err="1" smtClean="0"/>
-              <a:t>Allaudeen</a:t>
-            </a:r>
-            <a:r>
-              <a:rPr lang="en-US" sz="1600" dirty="0"/>
-              <a:t>, N., </a:t>
-            </a:r>
-            <a:r>
-              <a:rPr lang="en-US" sz="1600" dirty="0" err="1"/>
-              <a:t>Schnipper</a:t>
-            </a:r>
-            <a:r>
-              <a:rPr lang="en-US" sz="1600" dirty="0"/>
-              <a:t>, J. L., </a:t>
-            </a:r>
-            <a:r>
-              <a:rPr lang="en-US" sz="1600" dirty="0" err="1"/>
-              <a:t>Orav</a:t>
-            </a:r>
-            <a:r>
-              <a:rPr lang="en-US" sz="1600" dirty="0"/>
-              <a:t>, E. J., </a:t>
-            </a:r>
-            <a:r>
-              <a:rPr lang="en-US" sz="1600" dirty="0" err="1"/>
-              <a:t>Wachter</a:t>
-            </a:r>
-            <a:r>
-              <a:rPr lang="en-US" sz="1600" dirty="0"/>
-              <a:t>, R. M. &amp; </a:t>
-            </a:r>
-            <a:r>
-              <a:rPr lang="en-US" sz="1600" dirty="0" err="1"/>
-              <a:t>Vidyarthi</a:t>
-            </a:r>
-            <a:r>
-              <a:rPr lang="en-US" sz="1600" dirty="0"/>
-              <a:t>, A. R. Inability of Providers to Predict Unplanned </a:t>
-            </a:r>
-            <a:r>
-              <a:rPr lang="en-US" sz="1600" dirty="0" smtClean="0"/>
-              <a:t/>
-            </a:r>
-            <a:br>
-              <a:rPr lang="en-US" sz="1600" dirty="0" smtClean="0"/>
-            </a:br>
-            <a:r>
-              <a:rPr lang="en-US" sz="1600" dirty="0" smtClean="0"/>
-              <a:t>  Readmissions</a:t>
-            </a:r>
-            <a:r>
-              <a:rPr lang="en-US" sz="1600" dirty="0"/>
-              <a:t>. </a:t>
-            </a:r>
-            <a:r>
-              <a:rPr lang="en-US" sz="1600" i="1" dirty="0"/>
-              <a:t>J Gen Intern Med</a:t>
-            </a:r>
-            <a:r>
-              <a:rPr lang="en-US" sz="1600" dirty="0"/>
-              <a:t> </a:t>
-            </a:r>
-            <a:r>
-              <a:rPr lang="en-US" sz="1600" b="1" dirty="0"/>
-              <a:t>26,</a:t>
-            </a:r>
-            <a:r>
-              <a:rPr lang="en-US" sz="1600" dirty="0"/>
-              <a:t> 771–776 (2011).</a:t>
-            </a:r>
-          </a:p>
-          <a:p>
-            <a:pPr marL="0" indent="0">
-              <a:buNone/>
-            </a:pPr>
-            <a:endParaRPr lang="en-US" sz="1700" dirty="0" smtClean="0"/>
           </a:p>
           <a:p>
             <a:pPr marL="0" indent="0">
@@ -17801,6 +17169,94 @@
             </a:pPr>
             <a:endParaRPr lang="en-US" sz="1700" dirty="0"/>
           </a:p>
+          <a:p>
+            <a:pPr marL="0" indent="0">
+              <a:buNone/>
+            </a:pPr>
+            <a:r>
+              <a:rPr lang="en-US" sz="1600" baseline="30000" dirty="0"/>
+              <a:t>2</a:t>
+            </a:r>
+            <a:r>
+              <a:rPr lang="en-US" sz="1600" dirty="0"/>
+              <a:t> </a:t>
+            </a:r>
+            <a:r>
+              <a:rPr lang="en-US" sz="1600" dirty="0" err="1"/>
+              <a:t>Allaudeen</a:t>
+            </a:r>
+            <a:r>
+              <a:rPr lang="en-US" sz="1600" dirty="0"/>
+              <a:t>, N., </a:t>
+            </a:r>
+            <a:r>
+              <a:rPr lang="en-US" sz="1600" dirty="0" err="1"/>
+              <a:t>Schnipper</a:t>
+            </a:r>
+            <a:r>
+              <a:rPr lang="en-US" sz="1600" dirty="0"/>
+              <a:t>, J. L., </a:t>
+            </a:r>
+            <a:r>
+              <a:rPr lang="en-US" sz="1600" dirty="0" err="1"/>
+              <a:t>Orav</a:t>
+            </a:r>
+            <a:r>
+              <a:rPr lang="en-US" sz="1600" dirty="0"/>
+              <a:t>, E. J., </a:t>
+            </a:r>
+            <a:r>
+              <a:rPr lang="en-US" sz="1600" dirty="0" err="1"/>
+              <a:t>Wachter</a:t>
+            </a:r>
+            <a:r>
+              <a:rPr lang="en-US" sz="1600" dirty="0"/>
+              <a:t>, R. M. &amp; </a:t>
+            </a:r>
+            <a:r>
+              <a:rPr lang="en-US" sz="1600" dirty="0" err="1"/>
+              <a:t>Vidyarthi</a:t>
+            </a:r>
+            <a:r>
+              <a:rPr lang="en-US" sz="1600" dirty="0"/>
+              <a:t>, A. R. Inability of Providers to Predict Unplanned </a:t>
+            </a:r>
+            <a:br>
+              <a:rPr lang="en-US" sz="1600" dirty="0"/>
+            </a:br>
+            <a:r>
+              <a:rPr lang="en-US" sz="1600" dirty="0"/>
+              <a:t>  Readmissions. </a:t>
+            </a:r>
+            <a:r>
+              <a:rPr lang="en-US" sz="1600" i="1" dirty="0"/>
+              <a:t>J Gen Intern Med</a:t>
+            </a:r>
+            <a:r>
+              <a:rPr lang="en-US" sz="1600" dirty="0"/>
+              <a:t> </a:t>
+            </a:r>
+            <a:r>
+              <a:rPr lang="en-US" sz="1600" b="1" dirty="0"/>
+              <a:t>26,</a:t>
+            </a:r>
+            <a:r>
+              <a:rPr lang="en-US" sz="1600" dirty="0"/>
+              <a:t> 771–776 (2011).</a:t>
+            </a:r>
+          </a:p>
+          <a:p>
+            <a:pPr marL="0" indent="0">
+              <a:buNone/>
+            </a:pPr>
+            <a:endParaRPr lang="en-US" sz="1700" dirty="0"/>
+          </a:p>
+          <a:p>
+            <a:pPr marL="0" indent="0">
+              <a:buNone/>
+            </a:pPr>
+            <a:endParaRPr lang="en-US" sz="1700" dirty="0"/>
+          </a:p>
         </p:txBody>
       </p:sp>
       <p:sp>
@@ -17819,10 +17275,9 @@
           <a:lstStyle/>
           <a:p>
             <a:r>
-              <a:rPr lang="en-US" smtClean="0"/>
+              <a:rPr lang="en-US"/>
               <a:t>7/28/2015</a:t>
             </a:r>
-            <a:endParaRPr lang="en-US"/>
           </a:p>
         </p:txBody>
       </p:sp>
@@ -17842,10 +17297,9 @@
           <a:lstStyle/>
           <a:p>
             <a:r>
-              <a:rPr lang="en-US" smtClean="0"/>
+              <a:rPr lang="en-US"/>
               <a:t>UVA Medical System</a:t>
             </a:r>
-            <a:endParaRPr lang="en-US"/>
           </a:p>
         </p:txBody>
       </p:sp>
@@ -17918,10 +17372,9 @@
           <a:lstStyle/>
           <a:p>
             <a:r>
-              <a:rPr lang="en-US" dirty="0" smtClean="0"/>
+              <a:rPr lang="en-US" dirty="0"/>
               <a:t>State of the Art</a:t>
             </a:r>
-            <a:endParaRPr lang="en-US" dirty="0"/>
           </a:p>
         </p:txBody>
       </p:sp>
@@ -17943,7 +17396,7 @@
           <a:lstStyle/>
           <a:p>
             <a:r>
-              <a:rPr lang="en-US" b="1" dirty="0" smtClean="0"/>
+              <a:rPr lang="en-US" b="1" dirty="0"/>
               <a:t>Limiting Factors: </a:t>
             </a:r>
           </a:p>
@@ -17953,7 +17406,7 @@
               <a:buAutoNum type="arabicPeriod"/>
             </a:pPr>
             <a:r>
-              <a:rPr lang="en-US" dirty="0" smtClean="0"/>
+              <a:rPr lang="en-US" dirty="0"/>
               <a:t>Data:</a:t>
             </a:r>
           </a:p>
@@ -17963,7 +17416,7 @@
               <a:buAutoNum type="arabicPeriod"/>
             </a:pPr>
             <a:r>
-              <a:rPr lang="en-US" dirty="0" smtClean="0"/>
+              <a:rPr lang="en-US" dirty="0"/>
               <a:t>Modeling methodology:</a:t>
             </a:r>
           </a:p>
@@ -17973,7 +17426,7 @@
               <a:buAutoNum type="arabicPeriod"/>
             </a:pPr>
             <a:r>
-              <a:rPr lang="en-US" dirty="0" smtClean="0"/>
+              <a:rPr lang="en-US" dirty="0"/>
               <a:t>Feature engineering:</a:t>
             </a:r>
           </a:p>
@@ -17983,7 +17436,7 @@
               <a:buAutoNum type="arabicPeriod"/>
             </a:pPr>
             <a:r>
-              <a:rPr lang="en-US" dirty="0" smtClean="0"/>
+              <a:rPr lang="en-US" dirty="0"/>
               <a:t>Target</a:t>
             </a:r>
           </a:p>
@@ -17993,10 +17446,9 @@
               <a:buAutoNum type="arabicPeriod"/>
             </a:pPr>
             <a:r>
-              <a:rPr lang="en-US" dirty="0" smtClean="0"/>
+              <a:rPr lang="en-US" dirty="0"/>
               <a:t>Delivery mechanism</a:t>
             </a:r>
-            <a:endParaRPr lang="en-US" dirty="0"/>
           </a:p>
         </p:txBody>
       </p:sp>
@@ -18016,10 +17468,9 @@
           <a:lstStyle/>
           <a:p>
             <a:r>
-              <a:rPr lang="en-US" smtClean="0"/>
+              <a:rPr lang="en-US"/>
               <a:t>7/28/2015</a:t>
             </a:r>
-            <a:endParaRPr lang="en-US"/>
           </a:p>
         </p:txBody>
       </p:sp>
@@ -18039,10 +17490,9 @@
           <a:lstStyle/>
           <a:p>
             <a:r>
-              <a:rPr lang="en-US" smtClean="0"/>
+              <a:rPr lang="en-US"/>
               <a:t>UVA Medical System</a:t>
             </a:r>
-            <a:endParaRPr lang="en-US"/>
           </a:p>
         </p:txBody>
       </p:sp>
@@ -18115,10 +17565,9 @@
           <a:lstStyle/>
           <a:p>
             <a:r>
-              <a:rPr lang="en-US" dirty="0" smtClean="0"/>
+              <a:rPr lang="en-US" dirty="0"/>
               <a:t>Data – CMS Claims Data Files</a:t>
             </a:r>
-            <a:endParaRPr lang="en-US" dirty="0"/>
           </a:p>
         </p:txBody>
       </p:sp>
@@ -18138,10 +17587,9 @@
           <a:lstStyle/>
           <a:p>
             <a:r>
-              <a:rPr lang="en-US" smtClean="0"/>
+              <a:rPr lang="en-US"/>
               <a:t>7/28/2015</a:t>
             </a:r>
-            <a:endParaRPr lang="en-US"/>
           </a:p>
         </p:txBody>
       </p:sp>
@@ -18161,10 +17609,9 @@
           <a:lstStyle/>
           <a:p>
             <a:r>
-              <a:rPr lang="en-US" smtClean="0"/>
+              <a:rPr lang="en-US"/>
               <a:t>UVA Medical System</a:t>
             </a:r>
-            <a:endParaRPr lang="en-US"/>
           </a:p>
         </p:txBody>
       </p:sp>
@@ -18261,10 +17708,9 @@
           <a:lstStyle/>
           <a:p>
             <a:r>
-              <a:rPr lang="en-US" dirty="0" smtClean="0"/>
+              <a:rPr lang="en-US" dirty="0"/>
               <a:t>ACO Claims Schema</a:t>
             </a:r>
-            <a:endParaRPr lang="en-US" dirty="0"/>
           </a:p>
         </p:txBody>
       </p:sp>
@@ -18284,10 +17730,9 @@
           <a:lstStyle/>
           <a:p>
             <a:r>
-              <a:rPr lang="en-US" smtClean="0"/>
+              <a:rPr lang="en-US"/>
               <a:t>7/28/2015</a:t>
             </a:r>
-            <a:endParaRPr lang="en-US"/>
           </a:p>
         </p:txBody>
       </p:sp>
@@ -18307,10 +17752,9 @@
           <a:lstStyle/>
           <a:p>
             <a:r>
-              <a:rPr lang="en-US" smtClean="0"/>
+              <a:rPr lang="en-US"/>
               <a:t>UVA Medical System</a:t>
             </a:r>
-            <a:endParaRPr lang="en-US"/>
           </a:p>
         </p:txBody>
       </p:sp>

</xml_diff>